<commit_message>
docs/scope_overview.pptx: widen the slide so that we can fit more
</commit_message>
<xml_diff>
--- a/docs/scope_overview.pptx
+++ b/docs/scope_overview.pptx
@@ -7,7 +7,7 @@
   <p:sldIdLst>
     <p:sldId id="256" r:id="rId2"/>
   </p:sldIdLst>
-  <p:sldSz cx="9144000" cy="6858000" type="screen4x3"/>
+  <p:sldSz cx="13716000" cy="6858000"/>
   <p:notesSz cx="6858000" cy="9144000"/>
   <p:defaultTextStyle>
     <a:defPPr>
@@ -136,8 +136,8 @@
         </p:nvSpPr>
         <p:spPr>
           <a:xfrm>
-            <a:off x="685800" y="2130425"/>
-            <a:ext cx="7772400" cy="1470025"/>
+            <a:off x="1028700" y="2130426"/>
+            <a:ext cx="11658600" cy="1470025"/>
           </a:xfrm>
         </p:spPr>
         <p:txBody>
@@ -164,8 +164,8 @@
         </p:nvSpPr>
         <p:spPr>
           <a:xfrm>
-            <a:off x="1371600" y="3886200"/>
-            <a:ext cx="6400800" cy="1752600"/>
+            <a:off x="2057400" y="3886200"/>
+            <a:ext cx="9601200" cy="1752600"/>
           </a:xfrm>
         </p:spPr>
         <p:txBody>
@@ -286,7 +286,7 @@
           <a:bodyPr/>
           <a:lstStyle/>
           <a:p>
-            <a:fld id="{F47EE137-069B-44A0-A12B-A82CC5AD1C56}" type="datetimeFigureOut">
+            <a:fld id="{BB8F1B3F-F425-43A1-A5D6-4A28EB036C8A}" type="datetimeFigureOut">
               <a:rPr lang="en-US" smtClean="0"/>
               <a:t>2010-06-07</a:t>
             </a:fld>
@@ -328,7 +328,7 @@
           <a:bodyPr/>
           <a:lstStyle/>
           <a:p>
-            <a:fld id="{D0F57DE0-1F99-4CFE-9550-B96AF4812944}" type="slidenum">
+            <a:fld id="{7E8B09F5-3231-45AB-B761-5B1B524C5000}" type="slidenum">
               <a:rPr lang="en-US" smtClean="0"/>
               <a:t>‹#›</a:t>
             </a:fld>
@@ -339,7 +339,7 @@
     </p:spTree>
     <p:extLst>
       <p:ext uri="{BB962C8B-B14F-4D97-AF65-F5344CB8AC3E}">
-        <p14:creationId xmlns:p14="http://schemas.microsoft.com/office/powerpoint/2010/main" val="488116570"/>
+        <p14:creationId xmlns:p14="http://schemas.microsoft.com/office/powerpoint/2010/main" val="2095303590"/>
       </p:ext>
     </p:extLst>
   </p:cSld>
@@ -456,7 +456,7 @@
           <a:bodyPr/>
           <a:lstStyle/>
           <a:p>
-            <a:fld id="{F47EE137-069B-44A0-A12B-A82CC5AD1C56}" type="datetimeFigureOut">
+            <a:fld id="{BB8F1B3F-F425-43A1-A5D6-4A28EB036C8A}" type="datetimeFigureOut">
               <a:rPr lang="en-US" smtClean="0"/>
               <a:t>2010-06-07</a:t>
             </a:fld>
@@ -498,7 +498,7 @@
           <a:bodyPr/>
           <a:lstStyle/>
           <a:p>
-            <a:fld id="{D0F57DE0-1F99-4CFE-9550-B96AF4812944}" type="slidenum">
+            <a:fld id="{7E8B09F5-3231-45AB-B761-5B1B524C5000}" type="slidenum">
               <a:rPr lang="en-US" smtClean="0"/>
               <a:t>‹#›</a:t>
             </a:fld>
@@ -509,7 +509,7 @@
     </p:spTree>
     <p:extLst>
       <p:ext uri="{BB962C8B-B14F-4D97-AF65-F5344CB8AC3E}">
-        <p14:creationId xmlns:p14="http://schemas.microsoft.com/office/powerpoint/2010/main" val="407531178"/>
+        <p14:creationId xmlns:p14="http://schemas.microsoft.com/office/powerpoint/2010/main" val="1749053017"/>
       </p:ext>
     </p:extLst>
   </p:cSld>
@@ -548,8 +548,8 @@
         </p:nvSpPr>
         <p:spPr>
           <a:xfrm>
-            <a:off x="6629400" y="274638"/>
-            <a:ext cx="2057400" cy="5851525"/>
+            <a:off x="14916150" y="274639"/>
+            <a:ext cx="4629150" cy="5851525"/>
           </a:xfrm>
         </p:spPr>
         <p:txBody>
@@ -576,8 +576,8 @@
         </p:nvSpPr>
         <p:spPr>
           <a:xfrm>
-            <a:off x="457200" y="274638"/>
-            <a:ext cx="6019800" cy="5851525"/>
+            <a:off x="1028700" y="274639"/>
+            <a:ext cx="13658850" cy="5851525"/>
           </a:xfrm>
         </p:spPr>
         <p:txBody>
@@ -636,7 +636,7 @@
           <a:bodyPr/>
           <a:lstStyle/>
           <a:p>
-            <a:fld id="{F47EE137-069B-44A0-A12B-A82CC5AD1C56}" type="datetimeFigureOut">
+            <a:fld id="{BB8F1B3F-F425-43A1-A5D6-4A28EB036C8A}" type="datetimeFigureOut">
               <a:rPr lang="en-US" smtClean="0"/>
               <a:t>2010-06-07</a:t>
             </a:fld>
@@ -678,7 +678,7 @@
           <a:bodyPr/>
           <a:lstStyle/>
           <a:p>
-            <a:fld id="{D0F57DE0-1F99-4CFE-9550-B96AF4812944}" type="slidenum">
+            <a:fld id="{7E8B09F5-3231-45AB-B761-5B1B524C5000}" type="slidenum">
               <a:rPr lang="en-US" smtClean="0"/>
               <a:t>‹#›</a:t>
             </a:fld>
@@ -689,7 +689,7 @@
     </p:spTree>
     <p:extLst>
       <p:ext uri="{BB962C8B-B14F-4D97-AF65-F5344CB8AC3E}">
-        <p14:creationId xmlns:p14="http://schemas.microsoft.com/office/powerpoint/2010/main" val="2530935173"/>
+        <p14:creationId xmlns:p14="http://schemas.microsoft.com/office/powerpoint/2010/main" val="884516025"/>
       </p:ext>
     </p:extLst>
   </p:cSld>
@@ -806,7 +806,7 @@
           <a:bodyPr/>
           <a:lstStyle/>
           <a:p>
-            <a:fld id="{F47EE137-069B-44A0-A12B-A82CC5AD1C56}" type="datetimeFigureOut">
+            <a:fld id="{BB8F1B3F-F425-43A1-A5D6-4A28EB036C8A}" type="datetimeFigureOut">
               <a:rPr lang="en-US" smtClean="0"/>
               <a:t>2010-06-07</a:t>
             </a:fld>
@@ -848,7 +848,7 @@
           <a:bodyPr/>
           <a:lstStyle/>
           <a:p>
-            <a:fld id="{D0F57DE0-1F99-4CFE-9550-B96AF4812944}" type="slidenum">
+            <a:fld id="{7E8B09F5-3231-45AB-B761-5B1B524C5000}" type="slidenum">
               <a:rPr lang="en-US" smtClean="0"/>
               <a:t>‹#›</a:t>
             </a:fld>
@@ -859,7 +859,7 @@
     </p:spTree>
     <p:extLst>
       <p:ext uri="{BB962C8B-B14F-4D97-AF65-F5344CB8AC3E}">
-        <p14:creationId xmlns:p14="http://schemas.microsoft.com/office/powerpoint/2010/main" val="1385221479"/>
+        <p14:creationId xmlns:p14="http://schemas.microsoft.com/office/powerpoint/2010/main" val="1427269438"/>
       </p:ext>
     </p:extLst>
   </p:cSld>
@@ -898,8 +898,8 @@
         </p:nvSpPr>
         <p:spPr>
           <a:xfrm>
-            <a:off x="722313" y="4406900"/>
-            <a:ext cx="7772400" cy="1362075"/>
+            <a:off x="1083470" y="4406901"/>
+            <a:ext cx="11658600" cy="1362075"/>
           </a:xfrm>
         </p:spPr>
         <p:txBody>
@@ -930,8 +930,8 @@
         </p:nvSpPr>
         <p:spPr>
           <a:xfrm>
-            <a:off x="722313" y="2906713"/>
-            <a:ext cx="7772400" cy="1500187"/>
+            <a:off x="1083470" y="2906713"/>
+            <a:ext cx="11658600" cy="1500187"/>
           </a:xfrm>
         </p:spPr>
         <p:txBody>
@@ -1052,7 +1052,7 @@
           <a:bodyPr/>
           <a:lstStyle/>
           <a:p>
-            <a:fld id="{F47EE137-069B-44A0-A12B-A82CC5AD1C56}" type="datetimeFigureOut">
+            <a:fld id="{BB8F1B3F-F425-43A1-A5D6-4A28EB036C8A}" type="datetimeFigureOut">
               <a:rPr lang="en-US" smtClean="0"/>
               <a:t>2010-06-07</a:t>
             </a:fld>
@@ -1094,7 +1094,7 @@
           <a:bodyPr/>
           <a:lstStyle/>
           <a:p>
-            <a:fld id="{D0F57DE0-1F99-4CFE-9550-B96AF4812944}" type="slidenum">
+            <a:fld id="{7E8B09F5-3231-45AB-B761-5B1B524C5000}" type="slidenum">
               <a:rPr lang="en-US" smtClean="0"/>
               <a:t>‹#›</a:t>
             </a:fld>
@@ -1105,7 +1105,7 @@
     </p:spTree>
     <p:extLst>
       <p:ext uri="{BB962C8B-B14F-4D97-AF65-F5344CB8AC3E}">
-        <p14:creationId xmlns:p14="http://schemas.microsoft.com/office/powerpoint/2010/main" val="1678331202"/>
+        <p14:creationId xmlns:p14="http://schemas.microsoft.com/office/powerpoint/2010/main" val="1653779036"/>
       </p:ext>
     </p:extLst>
   </p:cSld>
@@ -1167,8 +1167,8 @@
         </p:nvSpPr>
         <p:spPr>
           <a:xfrm>
-            <a:off x="457200" y="1600200"/>
-            <a:ext cx="4038600" cy="4525963"/>
+            <a:off x="1028700" y="1600201"/>
+            <a:ext cx="9144000" cy="4525963"/>
           </a:xfrm>
         </p:spPr>
         <p:txBody>
@@ -1252,8 +1252,8 @@
         </p:nvSpPr>
         <p:spPr>
           <a:xfrm>
-            <a:off x="4648200" y="1600200"/>
-            <a:ext cx="4038600" cy="4525963"/>
+            <a:off x="10401300" y="1600201"/>
+            <a:ext cx="9144000" cy="4525963"/>
           </a:xfrm>
         </p:spPr>
         <p:txBody>
@@ -1340,7 +1340,7 @@
           <a:bodyPr/>
           <a:lstStyle/>
           <a:p>
-            <a:fld id="{F47EE137-069B-44A0-A12B-A82CC5AD1C56}" type="datetimeFigureOut">
+            <a:fld id="{BB8F1B3F-F425-43A1-A5D6-4A28EB036C8A}" type="datetimeFigureOut">
               <a:rPr lang="en-US" smtClean="0"/>
               <a:t>2010-06-07</a:t>
             </a:fld>
@@ -1382,7 +1382,7 @@
           <a:bodyPr/>
           <a:lstStyle/>
           <a:p>
-            <a:fld id="{D0F57DE0-1F99-4CFE-9550-B96AF4812944}" type="slidenum">
+            <a:fld id="{7E8B09F5-3231-45AB-B761-5B1B524C5000}" type="slidenum">
               <a:rPr lang="en-US" smtClean="0"/>
               <a:t>‹#›</a:t>
             </a:fld>
@@ -1393,7 +1393,7 @@
     </p:spTree>
     <p:extLst>
       <p:ext uri="{BB962C8B-B14F-4D97-AF65-F5344CB8AC3E}">
-        <p14:creationId xmlns:p14="http://schemas.microsoft.com/office/powerpoint/2010/main" val="660275509"/>
+        <p14:creationId xmlns:p14="http://schemas.microsoft.com/office/powerpoint/2010/main" val="3292777151"/>
       </p:ext>
     </p:extLst>
   </p:cSld>
@@ -1430,7 +1430,12 @@
             <p:ph type="title"/>
           </p:nvPr>
         </p:nvSpPr>
-        <p:spPr/>
+        <p:spPr>
+          <a:xfrm>
+            <a:off x="685800" y="274638"/>
+            <a:ext cx="12344400" cy="1143000"/>
+          </a:xfrm>
+        </p:spPr>
         <p:txBody>
           <a:bodyPr/>
           <a:lstStyle>
@@ -1459,8 +1464,8 @@
         </p:nvSpPr>
         <p:spPr>
           <a:xfrm>
-            <a:off x="457200" y="1535113"/>
-            <a:ext cx="4040188" cy="639762"/>
+            <a:off x="685800" y="1535113"/>
+            <a:ext cx="6060282" cy="639762"/>
           </a:xfrm>
         </p:spPr>
         <p:txBody>
@@ -1524,8 +1529,8 @@
         </p:nvSpPr>
         <p:spPr>
           <a:xfrm>
-            <a:off x="457200" y="2174875"/>
-            <a:ext cx="4040188" cy="3951288"/>
+            <a:off x="685800" y="2174875"/>
+            <a:ext cx="6060282" cy="3951288"/>
           </a:xfrm>
         </p:spPr>
         <p:txBody>
@@ -1609,8 +1614,8 @@
         </p:nvSpPr>
         <p:spPr>
           <a:xfrm>
-            <a:off x="4645025" y="1535113"/>
-            <a:ext cx="4041775" cy="639762"/>
+            <a:off x="6967538" y="1535113"/>
+            <a:ext cx="6062663" cy="639762"/>
           </a:xfrm>
         </p:spPr>
         <p:txBody>
@@ -1674,8 +1679,8 @@
         </p:nvSpPr>
         <p:spPr>
           <a:xfrm>
-            <a:off x="4645025" y="2174875"/>
-            <a:ext cx="4041775" cy="3951288"/>
+            <a:off x="6967538" y="2174875"/>
+            <a:ext cx="6062663" cy="3951288"/>
           </a:xfrm>
         </p:spPr>
         <p:txBody>
@@ -1762,7 +1767,7 @@
           <a:bodyPr/>
           <a:lstStyle/>
           <a:p>
-            <a:fld id="{F47EE137-069B-44A0-A12B-A82CC5AD1C56}" type="datetimeFigureOut">
+            <a:fld id="{BB8F1B3F-F425-43A1-A5D6-4A28EB036C8A}" type="datetimeFigureOut">
               <a:rPr lang="en-US" smtClean="0"/>
               <a:t>2010-06-07</a:t>
             </a:fld>
@@ -1804,7 +1809,7 @@
           <a:bodyPr/>
           <a:lstStyle/>
           <a:p>
-            <a:fld id="{D0F57DE0-1F99-4CFE-9550-B96AF4812944}" type="slidenum">
+            <a:fld id="{7E8B09F5-3231-45AB-B761-5B1B524C5000}" type="slidenum">
               <a:rPr lang="en-US" smtClean="0"/>
               <a:t>‹#›</a:t>
             </a:fld>
@@ -1815,7 +1820,7 @@
     </p:spTree>
     <p:extLst>
       <p:ext uri="{BB962C8B-B14F-4D97-AF65-F5344CB8AC3E}">
-        <p14:creationId xmlns:p14="http://schemas.microsoft.com/office/powerpoint/2010/main" val="531743401"/>
+        <p14:creationId xmlns:p14="http://schemas.microsoft.com/office/powerpoint/2010/main" val="2637145240"/>
       </p:ext>
     </p:extLst>
   </p:cSld>
@@ -1880,7 +1885,7 @@
           <a:bodyPr/>
           <a:lstStyle/>
           <a:p>
-            <a:fld id="{F47EE137-069B-44A0-A12B-A82CC5AD1C56}" type="datetimeFigureOut">
+            <a:fld id="{BB8F1B3F-F425-43A1-A5D6-4A28EB036C8A}" type="datetimeFigureOut">
               <a:rPr lang="en-US" smtClean="0"/>
               <a:t>2010-06-07</a:t>
             </a:fld>
@@ -1922,7 +1927,7 @@
           <a:bodyPr/>
           <a:lstStyle/>
           <a:p>
-            <a:fld id="{D0F57DE0-1F99-4CFE-9550-B96AF4812944}" type="slidenum">
+            <a:fld id="{7E8B09F5-3231-45AB-B761-5B1B524C5000}" type="slidenum">
               <a:rPr lang="en-US" smtClean="0"/>
               <a:t>‹#›</a:t>
             </a:fld>
@@ -1933,7 +1938,7 @@
     </p:spTree>
     <p:extLst>
       <p:ext uri="{BB962C8B-B14F-4D97-AF65-F5344CB8AC3E}">
-        <p14:creationId xmlns:p14="http://schemas.microsoft.com/office/powerpoint/2010/main" val="3663944946"/>
+        <p14:creationId xmlns:p14="http://schemas.microsoft.com/office/powerpoint/2010/main" val="3285335828"/>
       </p:ext>
     </p:extLst>
   </p:cSld>
@@ -1975,7 +1980,7 @@
           <a:bodyPr/>
           <a:lstStyle/>
           <a:p>
-            <a:fld id="{F47EE137-069B-44A0-A12B-A82CC5AD1C56}" type="datetimeFigureOut">
+            <a:fld id="{BB8F1B3F-F425-43A1-A5D6-4A28EB036C8A}" type="datetimeFigureOut">
               <a:rPr lang="en-US" smtClean="0"/>
               <a:t>2010-06-07</a:t>
             </a:fld>
@@ -2017,7 +2022,7 @@
           <a:bodyPr/>
           <a:lstStyle/>
           <a:p>
-            <a:fld id="{D0F57DE0-1F99-4CFE-9550-B96AF4812944}" type="slidenum">
+            <a:fld id="{7E8B09F5-3231-45AB-B761-5B1B524C5000}" type="slidenum">
               <a:rPr lang="en-US" smtClean="0"/>
               <a:t>‹#›</a:t>
             </a:fld>
@@ -2028,7 +2033,7 @@
     </p:spTree>
     <p:extLst>
       <p:ext uri="{BB962C8B-B14F-4D97-AF65-F5344CB8AC3E}">
-        <p14:creationId xmlns:p14="http://schemas.microsoft.com/office/powerpoint/2010/main" val="1905086625"/>
+        <p14:creationId xmlns:p14="http://schemas.microsoft.com/office/powerpoint/2010/main" val="3145509525"/>
       </p:ext>
     </p:extLst>
   </p:cSld>
@@ -2067,8 +2072,8 @@
         </p:nvSpPr>
         <p:spPr>
           <a:xfrm>
-            <a:off x="457200" y="273050"/>
-            <a:ext cx="3008313" cy="1162050"/>
+            <a:off x="685801" y="273050"/>
+            <a:ext cx="4512470" cy="1162050"/>
           </a:xfrm>
         </p:spPr>
         <p:txBody>
@@ -2099,8 +2104,8 @@
         </p:nvSpPr>
         <p:spPr>
           <a:xfrm>
-            <a:off x="3575050" y="273050"/>
-            <a:ext cx="5111750" cy="5853113"/>
+            <a:off x="5362575" y="273051"/>
+            <a:ext cx="7667625" cy="5853113"/>
           </a:xfrm>
         </p:spPr>
         <p:txBody>
@@ -2184,8 +2189,8 @@
         </p:nvSpPr>
         <p:spPr>
           <a:xfrm>
-            <a:off x="457200" y="1435100"/>
-            <a:ext cx="3008313" cy="4691063"/>
+            <a:off x="685801" y="1435101"/>
+            <a:ext cx="4512470" cy="4691063"/>
           </a:xfrm>
         </p:spPr>
         <p:txBody>
@@ -2252,7 +2257,7 @@
           <a:bodyPr/>
           <a:lstStyle/>
           <a:p>
-            <a:fld id="{F47EE137-069B-44A0-A12B-A82CC5AD1C56}" type="datetimeFigureOut">
+            <a:fld id="{BB8F1B3F-F425-43A1-A5D6-4A28EB036C8A}" type="datetimeFigureOut">
               <a:rPr lang="en-US" smtClean="0"/>
               <a:t>2010-06-07</a:t>
             </a:fld>
@@ -2294,7 +2299,7 @@
           <a:bodyPr/>
           <a:lstStyle/>
           <a:p>
-            <a:fld id="{D0F57DE0-1F99-4CFE-9550-B96AF4812944}" type="slidenum">
+            <a:fld id="{7E8B09F5-3231-45AB-B761-5B1B524C5000}" type="slidenum">
               <a:rPr lang="en-US" smtClean="0"/>
               <a:t>‹#›</a:t>
             </a:fld>
@@ -2305,7 +2310,7 @@
     </p:spTree>
     <p:extLst>
       <p:ext uri="{BB962C8B-B14F-4D97-AF65-F5344CB8AC3E}">
-        <p14:creationId xmlns:p14="http://schemas.microsoft.com/office/powerpoint/2010/main" val="2520930345"/>
+        <p14:creationId xmlns:p14="http://schemas.microsoft.com/office/powerpoint/2010/main" val="4022407737"/>
       </p:ext>
     </p:extLst>
   </p:cSld>
@@ -2344,8 +2349,8 @@
         </p:nvSpPr>
         <p:spPr>
           <a:xfrm>
-            <a:off x="1792288" y="4800600"/>
-            <a:ext cx="5486400" cy="566738"/>
+            <a:off x="2688432" y="4800600"/>
+            <a:ext cx="8229600" cy="566738"/>
           </a:xfrm>
         </p:spPr>
         <p:txBody>
@@ -2376,8 +2381,8 @@
         </p:nvSpPr>
         <p:spPr>
           <a:xfrm>
-            <a:off x="1792288" y="612775"/>
-            <a:ext cx="5486400" cy="4114800"/>
+            <a:off x="2688432" y="612775"/>
+            <a:ext cx="8229600" cy="4114800"/>
           </a:xfrm>
         </p:spPr>
         <p:txBody>
@@ -2437,8 +2442,8 @@
         </p:nvSpPr>
         <p:spPr>
           <a:xfrm>
-            <a:off x="1792288" y="5367338"/>
-            <a:ext cx="5486400" cy="804862"/>
+            <a:off x="2688432" y="5367338"/>
+            <a:ext cx="8229600" cy="804862"/>
           </a:xfrm>
         </p:spPr>
         <p:txBody>
@@ -2505,7 +2510,7 @@
           <a:bodyPr/>
           <a:lstStyle/>
           <a:p>
-            <a:fld id="{F47EE137-069B-44A0-A12B-A82CC5AD1C56}" type="datetimeFigureOut">
+            <a:fld id="{BB8F1B3F-F425-43A1-A5D6-4A28EB036C8A}" type="datetimeFigureOut">
               <a:rPr lang="en-US" smtClean="0"/>
               <a:t>2010-06-07</a:t>
             </a:fld>
@@ -2547,7 +2552,7 @@
           <a:bodyPr/>
           <a:lstStyle/>
           <a:p>
-            <a:fld id="{D0F57DE0-1F99-4CFE-9550-B96AF4812944}" type="slidenum">
+            <a:fld id="{7E8B09F5-3231-45AB-B761-5B1B524C5000}" type="slidenum">
               <a:rPr lang="en-US" smtClean="0"/>
               <a:t>‹#›</a:t>
             </a:fld>
@@ -2558,7 +2563,7 @@
     </p:spTree>
     <p:extLst>
       <p:ext uri="{BB962C8B-B14F-4D97-AF65-F5344CB8AC3E}">
-        <p14:creationId xmlns:p14="http://schemas.microsoft.com/office/powerpoint/2010/main" val="2510763521"/>
+        <p14:creationId xmlns:p14="http://schemas.microsoft.com/office/powerpoint/2010/main" val="598593130"/>
       </p:ext>
     </p:extLst>
   </p:cSld>
@@ -2602,8 +2607,8 @@
         </p:nvSpPr>
         <p:spPr>
           <a:xfrm>
-            <a:off x="457200" y="274638"/>
-            <a:ext cx="8229600" cy="1143000"/>
+            <a:off x="685800" y="274638"/>
+            <a:ext cx="12344400" cy="1143000"/>
           </a:xfrm>
           <a:prstGeom prst="rect">
             <a:avLst/>
@@ -2635,8 +2640,8 @@
         </p:nvSpPr>
         <p:spPr>
           <a:xfrm>
-            <a:off x="457200" y="1600200"/>
-            <a:ext cx="8229600" cy="4525963"/>
+            <a:off x="685800" y="1600201"/>
+            <a:ext cx="12344400" cy="4525963"/>
           </a:xfrm>
           <a:prstGeom prst="rect">
             <a:avLst/>
@@ -2697,8 +2702,8 @@
         </p:nvSpPr>
         <p:spPr>
           <a:xfrm>
-            <a:off x="457200" y="6356350"/>
-            <a:ext cx="2133600" cy="365125"/>
+            <a:off x="685800" y="6356351"/>
+            <a:ext cx="3200400" cy="365125"/>
           </a:xfrm>
           <a:prstGeom prst="rect">
             <a:avLst/>
@@ -2718,7 +2723,7 @@
             </a:lvl1pPr>
           </a:lstStyle>
           <a:p>
-            <a:fld id="{F47EE137-069B-44A0-A12B-A82CC5AD1C56}" type="datetimeFigureOut">
+            <a:fld id="{BB8F1B3F-F425-43A1-A5D6-4A28EB036C8A}" type="datetimeFigureOut">
               <a:rPr lang="en-US" smtClean="0"/>
               <a:t>2010-06-07</a:t>
             </a:fld>
@@ -2738,8 +2743,8 @@
         </p:nvSpPr>
         <p:spPr>
           <a:xfrm>
-            <a:off x="3124200" y="6356350"/>
-            <a:ext cx="2895600" cy="365125"/>
+            <a:off x="4686300" y="6356351"/>
+            <a:ext cx="4343400" cy="365125"/>
           </a:xfrm>
           <a:prstGeom prst="rect">
             <a:avLst/>
@@ -2775,8 +2780,8 @@
         </p:nvSpPr>
         <p:spPr>
           <a:xfrm>
-            <a:off x="6553200" y="6356350"/>
-            <a:ext cx="2133600" cy="365125"/>
+            <a:off x="9829800" y="6356351"/>
+            <a:ext cx="3200400" cy="365125"/>
           </a:xfrm>
           <a:prstGeom prst="rect">
             <a:avLst/>
@@ -2796,7 +2801,7 @@
             </a:lvl1pPr>
           </a:lstStyle>
           <a:p>
-            <a:fld id="{D0F57DE0-1F99-4CFE-9550-B96AF4812944}" type="slidenum">
+            <a:fld id="{7E8B09F5-3231-45AB-B761-5B1B524C5000}" type="slidenum">
               <a:rPr lang="en-US" smtClean="0"/>
               <a:t>‹#›</a:t>
             </a:fld>
@@ -2807,7 +2812,7 @@
     </p:spTree>
     <p:extLst>
       <p:ext uri="{BB962C8B-B14F-4D97-AF65-F5344CB8AC3E}">
-        <p14:creationId xmlns:p14="http://schemas.microsoft.com/office/powerpoint/2010/main" val="1833822872"/>
+        <p14:creationId xmlns:p14="http://schemas.microsoft.com/office/powerpoint/2010/main" val="662538647"/>
       </p:ext>
     </p:extLst>
   </p:cSld>
@@ -3103,7 +3108,7 @@
         </p:nvSpPr>
         <p:spPr>
           <a:xfrm>
-            <a:off x="48329" y="2999601"/>
+            <a:off x="48331" y="2999605"/>
             <a:ext cx="866071" cy="276999"/>
           </a:xfrm>
           <a:prstGeom prst="rect">
@@ -3135,13 +3140,13 @@
       </p:sp>
       <p:cxnSp>
         <p:nvCxnSpPr>
-          <p:cNvPr id="6" name="Straight Arrow Connector 5"/>
+          <p:cNvPr id="5" name="Straight Arrow Connector 4"/>
           <p:cNvCxnSpPr/>
           <p:nvPr/>
         </p:nvCxnSpPr>
         <p:spPr>
           <a:xfrm>
-            <a:off x="896570" y="3124200"/>
+            <a:off x="896572" y="3124200"/>
             <a:ext cx="586737" cy="0"/>
           </a:xfrm>
           <a:prstGeom prst="straightConnector1">
@@ -3172,13 +3177,13 @@
       </p:cxnSp>
       <p:cxnSp>
         <p:nvCxnSpPr>
-          <p:cNvPr id="7" name="Straight Arrow Connector 6"/>
+          <p:cNvPr id="6" name="Straight Arrow Connector 5"/>
           <p:cNvCxnSpPr/>
           <p:nvPr/>
         </p:nvCxnSpPr>
         <p:spPr>
           <a:xfrm flipH="1">
-            <a:off x="896568" y="3200400"/>
+            <a:off x="896570" y="3200400"/>
             <a:ext cx="586739" cy="0"/>
           </a:xfrm>
           <a:prstGeom prst="straightConnector1">
@@ -3209,14 +3214,14 @@
       </p:cxnSp>
       <p:sp>
         <p:nvSpPr>
-          <p:cNvPr id="13" name="TextBox 12"/>
+          <p:cNvPr id="7" name="TextBox 6"/>
           <p:cNvSpPr txBox="1"/>
           <p:nvPr/>
         </p:nvSpPr>
         <p:spPr>
           <a:xfrm>
-            <a:off x="1476984" y="2924784"/>
-            <a:ext cx="717119" cy="461665"/>
+            <a:off x="1476986" y="2924788"/>
+            <a:ext cx="717120" cy="461665"/>
           </a:xfrm>
           <a:prstGeom prst="rect">
             <a:avLst/>
@@ -3229,6 +3234,7 @@
           </a:bodyPr>
           <a:lstStyle/>
           <a:p>
+            <a:pPr algn="ctr"/>
             <a:r>
               <a:rPr lang="en-US" sz="1200" dirty="0" smtClean="0">
                 <a:latin typeface="Tahoma" pitchFamily="34" charset="0"/>
@@ -3239,6 +3245,7 @@
             </a:r>
           </a:p>
           <a:p>
+            <a:pPr algn="ctr"/>
             <a:r>
               <a:rPr lang="en-US" sz="1200" dirty="0" smtClean="0">
                 <a:latin typeface="Tahoma" pitchFamily="34" charset="0"/>
@@ -3257,14 +3264,14 @@
       </p:sp>
       <p:sp>
         <p:nvSpPr>
-          <p:cNvPr id="14" name="TextBox 13"/>
+          <p:cNvPr id="8" name="TextBox 7"/>
           <p:cNvSpPr txBox="1"/>
           <p:nvPr/>
         </p:nvSpPr>
         <p:spPr>
           <a:xfrm>
-            <a:off x="926791" y="3637002"/>
-            <a:ext cx="1968809" cy="553998"/>
+            <a:off x="926793" y="3429000"/>
+            <a:ext cx="2076209" cy="553998"/>
           </a:xfrm>
           <a:prstGeom prst="rect">
             <a:avLst/>
@@ -3293,7 +3300,7 @@
                 <a:ea typeface="Tahoma" pitchFamily="34" charset="0"/>
                 <a:cs typeface="Tahoma" pitchFamily="34" charset="0"/>
               </a:rPr>
-              <a:t>Stream has reliable send queue</a:t>
+              <a:t>Stream has a reliable send queue</a:t>
             </a:r>
           </a:p>
           <a:p>
@@ -3303,7 +3310,7 @@
                 <a:ea typeface="Tahoma" pitchFamily="34" charset="0"/>
                 <a:cs typeface="Tahoma" pitchFamily="34" charset="0"/>
               </a:rPr>
-              <a:t>Stream has receive window</a:t>
+              <a:t>Stream has a receive window</a:t>
             </a:r>
             <a:endParaRPr lang="en-US" sz="1000" dirty="0">
               <a:latin typeface="Tahoma" pitchFamily="34" charset="0"/>
@@ -3315,13 +3322,13 @@
       </p:sp>
       <p:sp>
         <p:nvSpPr>
-          <p:cNvPr id="17" name="TextBox 16"/>
+          <p:cNvPr id="9" name="TextBox 8"/>
           <p:cNvSpPr txBox="1"/>
           <p:nvPr/>
         </p:nvSpPr>
         <p:spPr>
           <a:xfrm>
-            <a:off x="798547" y="2667000"/>
+            <a:off x="882258" y="2676728"/>
             <a:ext cx="622286" cy="400110"/>
           </a:xfrm>
           <a:prstGeom prst="rect">
@@ -3363,13 +3370,348 @@
       </p:sp>
       <p:cxnSp>
         <p:nvCxnSpPr>
+          <p:cNvPr id="10" name="Straight Arrow Connector 9"/>
+          <p:cNvCxnSpPr/>
+          <p:nvPr/>
+        </p:nvCxnSpPr>
+        <p:spPr>
+          <a:xfrm>
+            <a:off x="2145812" y="2895600"/>
+            <a:ext cx="586737" cy="0"/>
+          </a:xfrm>
+          <a:prstGeom prst="straightConnector1">
+            <a:avLst/>
+          </a:prstGeom>
+          <a:ln w="19050" cap="flat">
+            <a:solidFill>
+              <a:schemeClr val="tx1"/>
+            </a:solidFill>
+            <a:round/>
+            <a:tailEnd type="triangle"/>
+          </a:ln>
+        </p:spPr>
+        <p:style>
+          <a:lnRef idx="1">
+            <a:schemeClr val="accent1"/>
+          </a:lnRef>
+          <a:fillRef idx="0">
+            <a:schemeClr val="accent1"/>
+          </a:fillRef>
+          <a:effectRef idx="0">
+            <a:schemeClr val="accent1"/>
+          </a:effectRef>
+          <a:fontRef idx="minor">
+            <a:schemeClr val="tx1"/>
+          </a:fontRef>
+        </p:style>
+      </p:cxnSp>
+      <p:cxnSp>
+        <p:nvCxnSpPr>
+          <p:cNvPr id="11" name="Straight Arrow Connector 10"/>
+          <p:cNvCxnSpPr/>
+          <p:nvPr/>
+        </p:nvCxnSpPr>
+        <p:spPr>
+          <a:xfrm flipH="1">
+            <a:off x="2143190" y="2971800"/>
+            <a:ext cx="586739" cy="0"/>
+          </a:xfrm>
+          <a:prstGeom prst="straightConnector1">
+            <a:avLst/>
+          </a:prstGeom>
+          <a:ln w="19050" cap="flat">
+            <a:solidFill>
+              <a:schemeClr val="tx1"/>
+            </a:solidFill>
+            <a:round/>
+            <a:tailEnd type="triangle"/>
+          </a:ln>
+        </p:spPr>
+        <p:style>
+          <a:lnRef idx="1">
+            <a:schemeClr val="accent1"/>
+          </a:lnRef>
+          <a:fillRef idx="0">
+            <a:schemeClr val="accent1"/>
+          </a:fillRef>
+          <a:effectRef idx="0">
+            <a:schemeClr val="accent1"/>
+          </a:effectRef>
+          <a:fontRef idx="minor">
+            <a:schemeClr val="tx1"/>
+          </a:fontRef>
+        </p:style>
+      </p:cxnSp>
+      <p:cxnSp>
+        <p:nvCxnSpPr>
+          <p:cNvPr id="12" name="Straight Arrow Connector 11"/>
+          <p:cNvCxnSpPr/>
+          <p:nvPr/>
+        </p:nvCxnSpPr>
+        <p:spPr>
+          <a:xfrm>
+            <a:off x="2161509" y="3272135"/>
+            <a:ext cx="586737" cy="0"/>
+          </a:xfrm>
+          <a:prstGeom prst="straightConnector1">
+            <a:avLst/>
+          </a:prstGeom>
+          <a:ln w="19050" cap="flat">
+            <a:solidFill>
+              <a:schemeClr val="tx1"/>
+            </a:solidFill>
+            <a:round/>
+            <a:tailEnd type="triangle"/>
+          </a:ln>
+        </p:spPr>
+        <p:style>
+          <a:lnRef idx="1">
+            <a:schemeClr val="accent1"/>
+          </a:lnRef>
+          <a:fillRef idx="0">
+            <a:schemeClr val="accent1"/>
+          </a:fillRef>
+          <a:effectRef idx="0">
+            <a:schemeClr val="accent1"/>
+          </a:effectRef>
+          <a:fontRef idx="minor">
+            <a:schemeClr val="tx1"/>
+          </a:fontRef>
+        </p:style>
+      </p:cxnSp>
+      <p:cxnSp>
+        <p:nvCxnSpPr>
+          <p:cNvPr id="13" name="Straight Arrow Connector 12"/>
+          <p:cNvCxnSpPr/>
+          <p:nvPr/>
+        </p:nvCxnSpPr>
+        <p:spPr>
+          <a:xfrm flipH="1">
+            <a:off x="2158887" y="3348335"/>
+            <a:ext cx="586739" cy="0"/>
+          </a:xfrm>
+          <a:prstGeom prst="straightConnector1">
+            <a:avLst/>
+          </a:prstGeom>
+          <a:ln w="19050" cap="flat">
+            <a:solidFill>
+              <a:schemeClr val="tx1"/>
+            </a:solidFill>
+            <a:round/>
+            <a:tailEnd type="triangle"/>
+          </a:ln>
+        </p:spPr>
+        <p:style>
+          <a:lnRef idx="1">
+            <a:schemeClr val="accent1"/>
+          </a:lnRef>
+          <a:fillRef idx="0">
+            <a:schemeClr val="accent1"/>
+          </a:fillRef>
+          <a:effectRef idx="0">
+            <a:schemeClr val="accent1"/>
+          </a:effectRef>
+          <a:fontRef idx="minor">
+            <a:schemeClr val="tx1"/>
+          </a:fontRef>
+        </p:style>
+      </p:cxnSp>
+      <p:sp>
+        <p:nvSpPr>
+          <p:cNvPr id="14" name="TextBox 13"/>
+          <p:cNvSpPr txBox="1"/>
+          <p:nvPr/>
+        </p:nvSpPr>
+        <p:spPr>
+          <a:xfrm>
+            <a:off x="2819402" y="2696188"/>
+            <a:ext cx="800797" cy="461665"/>
+          </a:xfrm>
+          <a:prstGeom prst="rect">
+            <a:avLst/>
+          </a:prstGeom>
+          <a:noFill/>
+        </p:spPr>
+        <p:txBody>
+          <a:bodyPr wrap="none" rtlCol="0">
+            <a:spAutoFit/>
+          </a:bodyPr>
+          <a:lstStyle/>
+          <a:p>
+            <a:pPr algn="ctr"/>
+            <a:r>
+              <a:rPr lang="en-US" sz="1200" dirty="0" smtClean="0">
+                <a:latin typeface="Tahoma" pitchFamily="34" charset="0"/>
+                <a:ea typeface="Tahoma" pitchFamily="34" charset="0"/>
+                <a:cs typeface="Tahoma" pitchFamily="34" charset="0"/>
+              </a:rPr>
+              <a:t>Primary</a:t>
+            </a:r>
+          </a:p>
+          <a:p>
+            <a:pPr algn="ctr"/>
+            <a:r>
+              <a:rPr lang="en-US" sz="1200" dirty="0" smtClean="0">
+                <a:latin typeface="Tahoma" pitchFamily="34" charset="0"/>
+                <a:ea typeface="Tahoma" pitchFamily="34" charset="0"/>
+                <a:cs typeface="Tahoma" pitchFamily="34" charset="0"/>
+              </a:rPr>
+              <a:t>transport</a:t>
+            </a:r>
+            <a:endParaRPr lang="en-US" sz="1200" dirty="0">
+              <a:latin typeface="Tahoma" pitchFamily="34" charset="0"/>
+              <a:ea typeface="Tahoma" pitchFamily="34" charset="0"/>
+              <a:cs typeface="Tahoma" pitchFamily="34" charset="0"/>
+            </a:endParaRPr>
+          </a:p>
+        </p:txBody>
+      </p:sp>
+      <p:sp>
+        <p:nvSpPr>
+          <p:cNvPr id="15" name="TextBox 14"/>
+          <p:cNvSpPr txBox="1"/>
+          <p:nvPr/>
+        </p:nvSpPr>
+        <p:spPr>
+          <a:xfrm>
+            <a:off x="2722390" y="3079203"/>
+            <a:ext cx="1015022" cy="461665"/>
+          </a:xfrm>
+          <a:prstGeom prst="rect">
+            <a:avLst/>
+          </a:prstGeom>
+          <a:noFill/>
+        </p:spPr>
+        <p:txBody>
+          <a:bodyPr wrap="none" rtlCol="0">
+            <a:spAutoFit/>
+          </a:bodyPr>
+          <a:lstStyle/>
+          <a:p>
+            <a:pPr algn="ctr"/>
+            <a:r>
+              <a:rPr lang="en-US" sz="1200" dirty="0" smtClean="0">
+                <a:latin typeface="Tahoma" pitchFamily="34" charset="0"/>
+                <a:ea typeface="Tahoma" pitchFamily="34" charset="0"/>
+                <a:cs typeface="Tahoma" pitchFamily="34" charset="0"/>
+              </a:rPr>
+              <a:t>A secondary</a:t>
+            </a:r>
+          </a:p>
+          <a:p>
+            <a:pPr algn="ctr"/>
+            <a:r>
+              <a:rPr lang="en-US" sz="1200" dirty="0" smtClean="0">
+                <a:latin typeface="Tahoma" pitchFamily="34" charset="0"/>
+                <a:ea typeface="Tahoma" pitchFamily="34" charset="0"/>
+                <a:cs typeface="Tahoma" pitchFamily="34" charset="0"/>
+              </a:rPr>
+              <a:t>transport</a:t>
+            </a:r>
+          </a:p>
+        </p:txBody>
+      </p:sp>
+      <p:sp>
+        <p:nvSpPr>
+          <p:cNvPr id="16" name="TextBox 15"/>
+          <p:cNvSpPr txBox="1"/>
+          <p:nvPr/>
+        </p:nvSpPr>
+        <p:spPr>
+          <a:xfrm>
+            <a:off x="2362202" y="1428690"/>
+            <a:ext cx="1630979" cy="400110"/>
+          </a:xfrm>
+          <a:prstGeom prst="rect">
+            <a:avLst/>
+          </a:prstGeom>
+          <a:noFill/>
+        </p:spPr>
+        <p:txBody>
+          <a:bodyPr wrap="square" rtlCol="0">
+            <a:spAutoFit/>
+          </a:bodyPr>
+          <a:lstStyle/>
+          <a:p>
+            <a:r>
+              <a:rPr lang="en-US" sz="1000" dirty="0" smtClean="0">
+                <a:latin typeface="Tahoma" pitchFamily="34" charset="0"/>
+                <a:ea typeface="Tahoma" pitchFamily="34" charset="0"/>
+                <a:cs typeface="Tahoma" pitchFamily="34" charset="0"/>
+              </a:rPr>
+              <a:t>Transport may be HTTP, TCP Socket, </a:t>
+            </a:r>
+            <a:r>
+              <a:rPr lang="en-US" sz="1000" dirty="0" err="1" smtClean="0">
+                <a:latin typeface="Tahoma" pitchFamily="34" charset="0"/>
+                <a:ea typeface="Tahoma" pitchFamily="34" charset="0"/>
+                <a:cs typeface="Tahoma" pitchFamily="34" charset="0"/>
+              </a:rPr>
+              <a:t>WebSocket</a:t>
+            </a:r>
+            <a:r>
+              <a:rPr lang="en-US" sz="1000" dirty="0" smtClean="0">
+                <a:latin typeface="Tahoma" pitchFamily="34" charset="0"/>
+                <a:ea typeface="Tahoma" pitchFamily="34" charset="0"/>
+                <a:cs typeface="Tahoma" pitchFamily="34" charset="0"/>
+              </a:rPr>
+              <a:t>.</a:t>
+            </a:r>
+            <a:endParaRPr lang="en-US" sz="1000" dirty="0">
+              <a:latin typeface="Tahoma" pitchFamily="34" charset="0"/>
+              <a:ea typeface="Tahoma" pitchFamily="34" charset="0"/>
+              <a:cs typeface="Tahoma" pitchFamily="34" charset="0"/>
+            </a:endParaRPr>
+          </a:p>
+        </p:txBody>
+      </p:sp>
+      <p:sp>
+        <p:nvSpPr>
+          <p:cNvPr id="17" name="TextBox 16"/>
+          <p:cNvSpPr txBox="1"/>
+          <p:nvPr/>
+        </p:nvSpPr>
+        <p:spPr>
+          <a:xfrm>
+            <a:off x="2362200" y="1805226"/>
+            <a:ext cx="1828800" cy="861774"/>
+          </a:xfrm>
+          <a:prstGeom prst="rect">
+            <a:avLst/>
+          </a:prstGeom>
+          <a:noFill/>
+        </p:spPr>
+        <p:txBody>
+          <a:bodyPr wrap="square" rtlCol="0">
+            <a:spAutoFit/>
+          </a:bodyPr>
+          <a:lstStyle/>
+          <a:p>
+            <a:r>
+              <a:rPr lang="en-US" sz="1000" dirty="0" smtClean="0">
+                <a:latin typeface="Tahoma" pitchFamily="34" charset="0"/>
+                <a:ea typeface="Tahoma" pitchFamily="34" charset="0"/>
+                <a:cs typeface="Tahoma" pitchFamily="34" charset="0"/>
+              </a:rPr>
+              <a:t>Primary receives strings. Secondary transport only needed if primary is HTTP. Can’t upload data over an already-open HTTP request.</a:t>
+            </a:r>
+            <a:endParaRPr lang="en-US" sz="1000" dirty="0">
+              <a:latin typeface="Tahoma" pitchFamily="34" charset="0"/>
+              <a:ea typeface="Tahoma" pitchFamily="34" charset="0"/>
+              <a:cs typeface="Tahoma" pitchFamily="34" charset="0"/>
+            </a:endParaRPr>
+          </a:p>
+        </p:txBody>
+      </p:sp>
+      <p:cxnSp>
+        <p:nvCxnSpPr>
           <p:cNvPr id="18" name="Straight Arrow Connector 17"/>
           <p:cNvCxnSpPr/>
           <p:nvPr/>
         </p:nvCxnSpPr>
         <p:spPr>
           <a:xfrm>
-            <a:off x="2145810" y="2895600"/>
+            <a:off x="3660224" y="2877768"/>
             <a:ext cx="586737" cy="0"/>
           </a:xfrm>
           <a:prstGeom prst="straightConnector1">
@@ -3406,7 +3748,7 @@
         </p:nvCxnSpPr>
         <p:spPr>
           <a:xfrm flipH="1">
-            <a:off x="2143188" y="2971800"/>
+            <a:off x="3657602" y="2953968"/>
             <a:ext cx="586739" cy="0"/>
           </a:xfrm>
           <a:prstGeom prst="straightConnector1">
@@ -3443,7 +3785,7 @@
         </p:nvCxnSpPr>
         <p:spPr>
           <a:xfrm>
-            <a:off x="2161507" y="3272135"/>
+            <a:off x="3675921" y="3254303"/>
             <a:ext cx="586737" cy="0"/>
           </a:xfrm>
           <a:prstGeom prst="straightConnector1">
@@ -3480,7 +3822,7 @@
         </p:nvCxnSpPr>
         <p:spPr>
           <a:xfrm flipH="1">
-            <a:off x="2158885" y="3348335"/>
+            <a:off x="3673299" y="3340231"/>
             <a:ext cx="586739" cy="0"/>
           </a:xfrm>
           <a:prstGeom prst="straightConnector1">
@@ -3517,8 +3859,8 @@
         </p:nvSpPr>
         <p:spPr>
           <a:xfrm>
-            <a:off x="2743200" y="2667000"/>
-            <a:ext cx="800797" cy="461665"/>
+            <a:off x="4235482" y="2771005"/>
+            <a:ext cx="869918" cy="276999"/>
           </a:xfrm>
           <a:prstGeom prst="rect">
             <a:avLst/>
@@ -3537,9 +3879,32 @@
                 <a:ea typeface="Tahoma" pitchFamily="34" charset="0"/>
                 <a:cs typeface="Tahoma" pitchFamily="34" charset="0"/>
               </a:rPr>
-              <a:t>Primary</a:t>
-            </a:r>
-          </a:p>
+              <a:t>TCP/HTTP</a:t>
+            </a:r>
+          </a:p>
+        </p:txBody>
+      </p:sp>
+      <p:sp>
+        <p:nvSpPr>
+          <p:cNvPr id="23" name="TextBox 22"/>
+          <p:cNvSpPr txBox="1"/>
+          <p:nvPr/>
+        </p:nvSpPr>
+        <p:spPr>
+          <a:xfrm>
+            <a:off x="4232234" y="3130316"/>
+            <a:ext cx="869918" cy="276999"/>
+          </a:xfrm>
+          <a:prstGeom prst="rect">
+            <a:avLst/>
+          </a:prstGeom>
+          <a:noFill/>
+        </p:spPr>
+        <p:txBody>
+          <a:bodyPr wrap="none" rtlCol="0">
+            <a:spAutoFit/>
+          </a:bodyPr>
+          <a:lstStyle/>
           <a:p>
             <a:r>
               <a:rPr lang="en-US" sz="1200" dirty="0" smtClean="0">
@@ -3547,26 +3912,252 @@
                 <a:ea typeface="Tahoma" pitchFamily="34" charset="0"/>
                 <a:cs typeface="Tahoma" pitchFamily="34" charset="0"/>
               </a:rPr>
-              <a:t>transport</a:t>
-            </a:r>
-            <a:endParaRPr lang="en-US" sz="1200" dirty="0">
-              <a:latin typeface="Tahoma" pitchFamily="34" charset="0"/>
-              <a:ea typeface="Tahoma" pitchFamily="34" charset="0"/>
-              <a:cs typeface="Tahoma" pitchFamily="34" charset="0"/>
-            </a:endParaRPr>
-          </a:p>
-        </p:txBody>
-      </p:sp>
-      <p:sp>
-        <p:nvSpPr>
-          <p:cNvPr id="23" name="TextBox 22"/>
+              <a:t>TCP/HTTP</a:t>
+            </a:r>
+          </a:p>
+        </p:txBody>
+      </p:sp>
+      <p:cxnSp>
+        <p:nvCxnSpPr>
+          <p:cNvPr id="24" name="Straight Arrow Connector 23"/>
+          <p:cNvCxnSpPr/>
+          <p:nvPr/>
+        </p:nvCxnSpPr>
+        <p:spPr>
+          <a:xfrm>
+            <a:off x="5092327" y="2876546"/>
+            <a:ext cx="586737" cy="0"/>
+          </a:xfrm>
+          <a:prstGeom prst="straightConnector1">
+            <a:avLst/>
+          </a:prstGeom>
+          <a:ln w="19050" cap="flat">
+            <a:solidFill>
+              <a:schemeClr val="tx1"/>
+            </a:solidFill>
+            <a:prstDash val="sysDash"/>
+            <a:round/>
+            <a:tailEnd type="triangle"/>
+          </a:ln>
+        </p:spPr>
+        <p:style>
+          <a:lnRef idx="1">
+            <a:schemeClr val="accent1"/>
+          </a:lnRef>
+          <a:fillRef idx="0">
+            <a:schemeClr val="accent1"/>
+          </a:fillRef>
+          <a:effectRef idx="0">
+            <a:schemeClr val="accent1"/>
+          </a:effectRef>
+          <a:fontRef idx="minor">
+            <a:schemeClr val="tx1"/>
+          </a:fontRef>
+        </p:style>
+      </p:cxnSp>
+      <p:cxnSp>
+        <p:nvCxnSpPr>
+          <p:cNvPr id="25" name="Straight Arrow Connector 24"/>
+          <p:cNvCxnSpPr/>
+          <p:nvPr/>
+        </p:nvCxnSpPr>
+        <p:spPr>
+          <a:xfrm flipH="1">
+            <a:off x="5089705" y="2952746"/>
+            <a:ext cx="586739" cy="0"/>
+          </a:xfrm>
+          <a:prstGeom prst="straightConnector1">
+            <a:avLst/>
+          </a:prstGeom>
+          <a:ln w="19050" cap="flat">
+            <a:solidFill>
+              <a:schemeClr val="tx1"/>
+            </a:solidFill>
+            <a:prstDash val="sysDash"/>
+            <a:round/>
+            <a:tailEnd type="triangle"/>
+          </a:ln>
+        </p:spPr>
+        <p:style>
+          <a:lnRef idx="1">
+            <a:schemeClr val="accent1"/>
+          </a:lnRef>
+          <a:fillRef idx="0">
+            <a:schemeClr val="accent1"/>
+          </a:fillRef>
+          <a:effectRef idx="0">
+            <a:schemeClr val="accent1"/>
+          </a:effectRef>
+          <a:fontRef idx="minor">
+            <a:schemeClr val="tx1"/>
+          </a:fontRef>
+        </p:style>
+      </p:cxnSp>
+      <p:cxnSp>
+        <p:nvCxnSpPr>
+          <p:cNvPr id="26" name="Straight Arrow Connector 25"/>
+          <p:cNvCxnSpPr/>
+          <p:nvPr/>
+        </p:nvCxnSpPr>
+        <p:spPr>
+          <a:xfrm>
+            <a:off x="5108024" y="3253081"/>
+            <a:ext cx="586737" cy="0"/>
+          </a:xfrm>
+          <a:prstGeom prst="straightConnector1">
+            <a:avLst/>
+          </a:prstGeom>
+          <a:ln w="19050" cap="flat">
+            <a:solidFill>
+              <a:schemeClr val="tx1"/>
+            </a:solidFill>
+            <a:prstDash val="sysDash"/>
+            <a:round/>
+            <a:tailEnd type="triangle"/>
+          </a:ln>
+        </p:spPr>
+        <p:style>
+          <a:lnRef idx="1">
+            <a:schemeClr val="accent1"/>
+          </a:lnRef>
+          <a:fillRef idx="0">
+            <a:schemeClr val="accent1"/>
+          </a:fillRef>
+          <a:effectRef idx="0">
+            <a:schemeClr val="accent1"/>
+          </a:effectRef>
+          <a:fontRef idx="minor">
+            <a:schemeClr val="tx1"/>
+          </a:fontRef>
+        </p:style>
+      </p:cxnSp>
+      <p:cxnSp>
+        <p:nvCxnSpPr>
+          <p:cNvPr id="27" name="Straight Arrow Connector 26"/>
+          <p:cNvCxnSpPr/>
+          <p:nvPr/>
+        </p:nvCxnSpPr>
+        <p:spPr>
+          <a:xfrm flipH="1">
+            <a:off x="5085946" y="3329281"/>
+            <a:ext cx="586739" cy="0"/>
+          </a:xfrm>
+          <a:prstGeom prst="straightConnector1">
+            <a:avLst/>
+          </a:prstGeom>
+          <a:ln w="19050" cap="flat">
+            <a:solidFill>
+              <a:schemeClr val="tx1"/>
+            </a:solidFill>
+            <a:prstDash val="sysDash"/>
+            <a:round/>
+            <a:tailEnd type="triangle"/>
+          </a:ln>
+        </p:spPr>
+        <p:style>
+          <a:lnRef idx="1">
+            <a:schemeClr val="accent1"/>
+          </a:lnRef>
+          <a:fillRef idx="0">
+            <a:schemeClr val="accent1"/>
+          </a:fillRef>
+          <a:effectRef idx="0">
+            <a:schemeClr val="accent1"/>
+          </a:effectRef>
+          <a:fontRef idx="minor">
+            <a:schemeClr val="tx1"/>
+          </a:fontRef>
+        </p:style>
+      </p:cxnSp>
+      <p:sp>
+        <p:nvSpPr>
+          <p:cNvPr id="28" name="Left Brace 27"/>
+          <p:cNvSpPr/>
+          <p:nvPr/>
+        </p:nvSpPr>
+        <p:spPr>
+          <a:xfrm rot="16200000">
+            <a:off x="2934730" y="1951932"/>
+            <a:ext cx="123217" cy="4186736"/>
+          </a:xfrm>
+          <a:prstGeom prst="leftBrace">
+            <a:avLst/>
+          </a:prstGeom>
+          <a:ln w="19050">
+            <a:solidFill>
+              <a:schemeClr val="tx1">
+                <a:lumMod val="50000"/>
+                <a:lumOff val="50000"/>
+              </a:schemeClr>
+            </a:solidFill>
+          </a:ln>
+        </p:spPr>
+        <p:style>
+          <a:lnRef idx="1">
+            <a:schemeClr val="accent1"/>
+          </a:lnRef>
+          <a:fillRef idx="0">
+            <a:schemeClr val="accent1"/>
+          </a:fillRef>
+          <a:effectRef idx="0">
+            <a:schemeClr val="accent1"/>
+          </a:effectRef>
+          <a:fontRef idx="minor">
+            <a:schemeClr val="tx1"/>
+          </a:fontRef>
+        </p:style>
+        <p:txBody>
+          <a:bodyPr rtlCol="0" anchor="ctr"/>
+          <a:lstStyle/>
+          <a:p>
+            <a:pPr algn="ctr"/>
+            <a:endParaRPr lang="en-US" dirty="0"/>
+          </a:p>
+        </p:txBody>
+      </p:sp>
+      <p:sp>
+        <p:nvSpPr>
+          <p:cNvPr id="29" name="TextBox 28"/>
           <p:cNvSpPr txBox="1"/>
           <p:nvPr/>
         </p:nvSpPr>
         <p:spPr>
           <a:xfrm>
-            <a:off x="2745453" y="3195935"/>
-            <a:ext cx="988347" cy="461665"/>
+            <a:off x="2514602" y="4097183"/>
+            <a:ext cx="970137" cy="246221"/>
+          </a:xfrm>
+          <a:prstGeom prst="rect">
+            <a:avLst/>
+          </a:prstGeom>
+          <a:noFill/>
+        </p:spPr>
+        <p:txBody>
+          <a:bodyPr wrap="none" rtlCol="0">
+            <a:spAutoFit/>
+          </a:bodyPr>
+          <a:lstStyle/>
+          <a:p>
+            <a:r>
+              <a:rPr lang="en-US" sz="1000" dirty="0" smtClean="0">
+                <a:latin typeface="Tahoma" pitchFamily="34" charset="0"/>
+                <a:ea typeface="Tahoma" pitchFamily="34" charset="0"/>
+                <a:cs typeface="Tahoma" pitchFamily="34" charset="0"/>
+              </a:rPr>
+              <a:t>Minerva client</a:t>
+            </a:r>
+          </a:p>
+        </p:txBody>
+      </p:sp>
+      <p:sp>
+        <p:nvSpPr>
+          <p:cNvPr id="30" name="TextBox 29"/>
+          <p:cNvSpPr txBox="1"/>
+          <p:nvPr/>
+        </p:nvSpPr>
+        <p:spPr>
+          <a:xfrm>
+            <a:off x="5635396" y="2769175"/>
+            <a:ext cx="869918" cy="276999"/>
           </a:xfrm>
           <a:prstGeom prst="rect">
             <a:avLst/>
@@ -3585,9 +4176,32 @@
                 <a:ea typeface="Tahoma" pitchFamily="34" charset="0"/>
                 <a:cs typeface="Tahoma" pitchFamily="34" charset="0"/>
               </a:rPr>
-              <a:t>Secondary</a:t>
-            </a:r>
-          </a:p>
+              <a:t>TCP/HTTP</a:t>
+            </a:r>
+          </a:p>
+        </p:txBody>
+      </p:sp>
+      <p:sp>
+        <p:nvSpPr>
+          <p:cNvPr id="31" name="TextBox 30"/>
+          <p:cNvSpPr txBox="1"/>
+          <p:nvPr/>
+        </p:nvSpPr>
+        <p:spPr>
+          <a:xfrm>
+            <a:off x="5632148" y="3128486"/>
+            <a:ext cx="869918" cy="276999"/>
+          </a:xfrm>
+          <a:prstGeom prst="rect">
+            <a:avLst/>
+          </a:prstGeom>
+          <a:noFill/>
+        </p:spPr>
+        <p:txBody>
+          <a:bodyPr wrap="none" rtlCol="0">
+            <a:spAutoFit/>
+          </a:bodyPr>
+          <a:lstStyle/>
           <a:p>
             <a:r>
               <a:rPr lang="en-US" sz="1200" dirty="0" smtClean="0">
@@ -3595,112 +4209,20 @@
                 <a:ea typeface="Tahoma" pitchFamily="34" charset="0"/>
                 <a:cs typeface="Tahoma" pitchFamily="34" charset="0"/>
               </a:rPr>
-              <a:t>transport(s)</a:t>
-            </a:r>
-          </a:p>
-        </p:txBody>
-      </p:sp>
-      <p:sp>
-        <p:nvSpPr>
-          <p:cNvPr id="26" name="TextBox 25"/>
-          <p:cNvSpPr txBox="1"/>
-          <p:nvPr/>
-        </p:nvSpPr>
-        <p:spPr>
-          <a:xfrm>
-            <a:off x="2362200" y="1428690"/>
-            <a:ext cx="1630979" cy="400110"/>
-          </a:xfrm>
-          <a:prstGeom prst="rect">
-            <a:avLst/>
-          </a:prstGeom>
-          <a:noFill/>
-        </p:spPr>
-        <p:txBody>
-          <a:bodyPr wrap="square" rtlCol="0">
-            <a:spAutoFit/>
-          </a:bodyPr>
-          <a:lstStyle/>
-          <a:p>
-            <a:r>
-              <a:rPr lang="en-US" sz="1000" dirty="0" smtClean="0">
-                <a:latin typeface="Tahoma" pitchFamily="34" charset="0"/>
-                <a:ea typeface="Tahoma" pitchFamily="34" charset="0"/>
-                <a:cs typeface="Tahoma" pitchFamily="34" charset="0"/>
-              </a:rPr>
-              <a:t>Transport may be HTTP, TCP Socket, </a:t>
-            </a:r>
-            <a:r>
-              <a:rPr lang="en-US" sz="1000" dirty="0" err="1" smtClean="0">
-                <a:latin typeface="Tahoma" pitchFamily="34" charset="0"/>
-                <a:ea typeface="Tahoma" pitchFamily="34" charset="0"/>
-                <a:cs typeface="Tahoma" pitchFamily="34" charset="0"/>
-              </a:rPr>
-              <a:t>WebSocket</a:t>
-            </a:r>
-            <a:r>
-              <a:rPr lang="en-US" sz="1000" dirty="0" smtClean="0">
-                <a:latin typeface="Tahoma" pitchFamily="34" charset="0"/>
-                <a:ea typeface="Tahoma" pitchFamily="34" charset="0"/>
-                <a:cs typeface="Tahoma" pitchFamily="34" charset="0"/>
-              </a:rPr>
-              <a:t>.</a:t>
-            </a:r>
-            <a:endParaRPr lang="en-US" sz="1000" dirty="0">
-              <a:latin typeface="Tahoma" pitchFamily="34" charset="0"/>
-              <a:ea typeface="Tahoma" pitchFamily="34" charset="0"/>
-              <a:cs typeface="Tahoma" pitchFamily="34" charset="0"/>
-            </a:endParaRPr>
-          </a:p>
-        </p:txBody>
-      </p:sp>
-      <p:sp>
-        <p:nvSpPr>
-          <p:cNvPr id="27" name="TextBox 26"/>
-          <p:cNvSpPr txBox="1"/>
-          <p:nvPr/>
-        </p:nvSpPr>
-        <p:spPr>
-          <a:xfrm>
-            <a:off x="2362200" y="1805226"/>
-            <a:ext cx="1828800" cy="861774"/>
-          </a:xfrm>
-          <a:prstGeom prst="rect">
-            <a:avLst/>
-          </a:prstGeom>
-          <a:noFill/>
-        </p:spPr>
-        <p:txBody>
-          <a:bodyPr wrap="square" rtlCol="0">
-            <a:spAutoFit/>
-          </a:bodyPr>
-          <a:lstStyle/>
-          <a:p>
-            <a:r>
-              <a:rPr lang="en-US" sz="1000" dirty="0" smtClean="0">
-                <a:latin typeface="Tahoma" pitchFamily="34" charset="0"/>
-                <a:ea typeface="Tahoma" pitchFamily="34" charset="0"/>
-                <a:cs typeface="Tahoma" pitchFamily="34" charset="0"/>
-              </a:rPr>
-              <a:t>Primary receives strings. Secondary transport only needed if primary is HTTP. Can’t upload data over an already-open HTTP request.</a:t>
-            </a:r>
-            <a:endParaRPr lang="en-US" sz="1000" dirty="0">
-              <a:latin typeface="Tahoma" pitchFamily="34" charset="0"/>
-              <a:ea typeface="Tahoma" pitchFamily="34" charset="0"/>
-              <a:cs typeface="Tahoma" pitchFamily="34" charset="0"/>
-            </a:endParaRPr>
+              <a:t>TCP/HTTP</a:t>
+            </a:r>
           </a:p>
         </p:txBody>
       </p:sp>
       <p:cxnSp>
         <p:nvCxnSpPr>
-          <p:cNvPr id="28" name="Straight Arrow Connector 27"/>
+          <p:cNvPr id="32" name="Straight Arrow Connector 31"/>
           <p:cNvCxnSpPr/>
           <p:nvPr/>
         </p:nvCxnSpPr>
         <p:spPr>
           <a:xfrm>
-            <a:off x="3660222" y="2877768"/>
+            <a:off x="6492240" y="2874716"/>
             <a:ext cx="586737" cy="0"/>
           </a:xfrm>
           <a:prstGeom prst="straightConnector1">
@@ -3731,13 +4253,13 @@
       </p:cxnSp>
       <p:cxnSp>
         <p:nvCxnSpPr>
-          <p:cNvPr id="29" name="Straight Arrow Connector 28"/>
+          <p:cNvPr id="33" name="Straight Arrow Connector 32"/>
           <p:cNvCxnSpPr/>
           <p:nvPr/>
         </p:nvCxnSpPr>
         <p:spPr>
           <a:xfrm flipH="1">
-            <a:off x="3657600" y="2953968"/>
+            <a:off x="6489618" y="2950916"/>
             <a:ext cx="586739" cy="0"/>
           </a:xfrm>
           <a:prstGeom prst="straightConnector1">
@@ -3768,159 +4290,19 @@
       </p:cxnSp>
       <p:cxnSp>
         <p:nvCxnSpPr>
-          <p:cNvPr id="30" name="Straight Arrow Connector 29"/>
+          <p:cNvPr id="34" name="Straight Arrow Connector 33"/>
           <p:cNvCxnSpPr/>
           <p:nvPr/>
         </p:nvCxnSpPr>
         <p:spPr>
           <a:xfrm>
-            <a:off x="3675919" y="3254303"/>
+            <a:off x="6507937" y="3251251"/>
             <a:ext cx="586737" cy="0"/>
           </a:xfrm>
           <a:prstGeom prst="straightConnector1">
             <a:avLst/>
           </a:prstGeom>
           <a:ln w="19050" cap="flat">
-            <a:solidFill>
-              <a:schemeClr val="tx1"/>
-            </a:solidFill>
-            <a:round/>
-            <a:tailEnd type="triangle"/>
-          </a:ln>
-        </p:spPr>
-        <p:style>
-          <a:lnRef idx="1">
-            <a:schemeClr val="accent1"/>
-          </a:lnRef>
-          <a:fillRef idx="0">
-            <a:schemeClr val="accent1"/>
-          </a:fillRef>
-          <a:effectRef idx="0">
-            <a:schemeClr val="accent1"/>
-          </a:effectRef>
-          <a:fontRef idx="minor">
-            <a:schemeClr val="tx1"/>
-          </a:fontRef>
-        </p:style>
-      </p:cxnSp>
-      <p:cxnSp>
-        <p:nvCxnSpPr>
-          <p:cNvPr id="31" name="Straight Arrow Connector 30"/>
-          <p:cNvCxnSpPr/>
-          <p:nvPr/>
-        </p:nvCxnSpPr>
-        <p:spPr>
-          <a:xfrm flipH="1">
-            <a:off x="3673297" y="3330503"/>
-            <a:ext cx="586739" cy="0"/>
-          </a:xfrm>
-          <a:prstGeom prst="straightConnector1">
-            <a:avLst/>
-          </a:prstGeom>
-          <a:ln w="19050" cap="flat">
-            <a:solidFill>
-              <a:schemeClr val="tx1"/>
-            </a:solidFill>
-            <a:round/>
-            <a:tailEnd type="triangle"/>
-          </a:ln>
-        </p:spPr>
-        <p:style>
-          <a:lnRef idx="1">
-            <a:schemeClr val="accent1"/>
-          </a:lnRef>
-          <a:fillRef idx="0">
-            <a:schemeClr val="accent1"/>
-          </a:fillRef>
-          <a:effectRef idx="0">
-            <a:schemeClr val="accent1"/>
-          </a:effectRef>
-          <a:fontRef idx="minor">
-            <a:schemeClr val="tx1"/>
-          </a:fontRef>
-        </p:style>
-      </p:cxnSp>
-      <p:sp>
-        <p:nvSpPr>
-          <p:cNvPr id="32" name="TextBox 31"/>
-          <p:cNvSpPr txBox="1"/>
-          <p:nvPr/>
-        </p:nvSpPr>
-        <p:spPr>
-          <a:xfrm>
-            <a:off x="4235482" y="2771001"/>
-            <a:ext cx="869918" cy="276999"/>
-          </a:xfrm>
-          <a:prstGeom prst="rect">
-            <a:avLst/>
-          </a:prstGeom>
-          <a:noFill/>
-        </p:spPr>
-        <p:txBody>
-          <a:bodyPr wrap="none" rtlCol="0">
-            <a:spAutoFit/>
-          </a:bodyPr>
-          <a:lstStyle/>
-          <a:p>
-            <a:r>
-              <a:rPr lang="en-US" sz="1200" dirty="0" smtClean="0">
-                <a:latin typeface="Tahoma" pitchFamily="34" charset="0"/>
-                <a:ea typeface="Tahoma" pitchFamily="34" charset="0"/>
-                <a:cs typeface="Tahoma" pitchFamily="34" charset="0"/>
-              </a:rPr>
-              <a:t>TCP/HTTP</a:t>
-            </a:r>
-          </a:p>
-        </p:txBody>
-      </p:sp>
-      <p:sp>
-        <p:nvSpPr>
-          <p:cNvPr id="33" name="TextBox 32"/>
-          <p:cNvSpPr txBox="1"/>
-          <p:nvPr/>
-        </p:nvSpPr>
-        <p:spPr>
-          <a:xfrm>
-            <a:off x="4232234" y="3130312"/>
-            <a:ext cx="869918" cy="276999"/>
-          </a:xfrm>
-          <a:prstGeom prst="rect">
-            <a:avLst/>
-          </a:prstGeom>
-          <a:noFill/>
-        </p:spPr>
-        <p:txBody>
-          <a:bodyPr wrap="none" rtlCol="0">
-            <a:spAutoFit/>
-          </a:bodyPr>
-          <a:lstStyle/>
-          <a:p>
-            <a:r>
-              <a:rPr lang="en-US" sz="1200" dirty="0" smtClean="0">
-                <a:latin typeface="Tahoma" pitchFamily="34" charset="0"/>
-                <a:ea typeface="Tahoma" pitchFamily="34" charset="0"/>
-                <a:cs typeface="Tahoma" pitchFamily="34" charset="0"/>
-              </a:rPr>
-              <a:t>TCP/HTTP</a:t>
-            </a:r>
-          </a:p>
-        </p:txBody>
-      </p:sp>
-      <p:cxnSp>
-        <p:nvCxnSpPr>
-          <p:cNvPr id="34" name="Straight Arrow Connector 33"/>
-          <p:cNvCxnSpPr/>
-          <p:nvPr/>
-        </p:nvCxnSpPr>
-        <p:spPr>
-          <a:xfrm>
-            <a:off x="5092325" y="2868441"/>
-            <a:ext cx="586737" cy="0"/>
-          </a:xfrm>
-          <a:prstGeom prst="straightConnector1">
-            <a:avLst/>
-          </a:prstGeom>
-          <a:ln w="47625" cap="flat" cmpd="dbl">
             <a:solidFill>
               <a:schemeClr val="tx1"/>
             </a:solidFill>
@@ -3951,87 +4333,13 @@
         </p:nvCxnSpPr>
         <p:spPr>
           <a:xfrm flipH="1">
-            <a:off x="5089703" y="2944641"/>
+            <a:off x="6485859" y="3327451"/>
             <a:ext cx="586739" cy="0"/>
           </a:xfrm>
           <a:prstGeom prst="straightConnector1">
             <a:avLst/>
           </a:prstGeom>
-          <a:ln w="47625" cap="flat" cmpd="dbl">
-            <a:solidFill>
-              <a:schemeClr val="tx1"/>
-            </a:solidFill>
-            <a:round/>
-            <a:tailEnd type="triangle"/>
-          </a:ln>
-        </p:spPr>
-        <p:style>
-          <a:lnRef idx="1">
-            <a:schemeClr val="accent1"/>
-          </a:lnRef>
-          <a:fillRef idx="0">
-            <a:schemeClr val="accent1"/>
-          </a:fillRef>
-          <a:effectRef idx="0">
-            <a:schemeClr val="accent1"/>
-          </a:effectRef>
-          <a:fontRef idx="minor">
-            <a:schemeClr val="tx1"/>
-          </a:fontRef>
-        </p:style>
-      </p:cxnSp>
-      <p:cxnSp>
-        <p:nvCxnSpPr>
-          <p:cNvPr id="36" name="Straight Arrow Connector 35"/>
-          <p:cNvCxnSpPr/>
-          <p:nvPr/>
-        </p:nvCxnSpPr>
-        <p:spPr>
-          <a:xfrm>
-            <a:off x="5108022" y="3244976"/>
-            <a:ext cx="586737" cy="0"/>
-          </a:xfrm>
-          <a:prstGeom prst="straightConnector1">
-            <a:avLst/>
-          </a:prstGeom>
-          <a:ln w="47625" cap="flat" cmpd="dbl">
-            <a:solidFill>
-              <a:schemeClr val="tx1"/>
-            </a:solidFill>
-            <a:round/>
-            <a:tailEnd type="triangle"/>
-          </a:ln>
-        </p:spPr>
-        <p:style>
-          <a:lnRef idx="1">
-            <a:schemeClr val="accent1"/>
-          </a:lnRef>
-          <a:fillRef idx="0">
-            <a:schemeClr val="accent1"/>
-          </a:fillRef>
-          <a:effectRef idx="0">
-            <a:schemeClr val="accent1"/>
-          </a:effectRef>
-          <a:fontRef idx="minor">
-            <a:schemeClr val="tx1"/>
-          </a:fontRef>
-        </p:style>
-      </p:cxnSp>
-      <p:cxnSp>
-        <p:nvCxnSpPr>
-          <p:cNvPr id="37" name="Straight Arrow Connector 36"/>
-          <p:cNvCxnSpPr/>
-          <p:nvPr/>
-        </p:nvCxnSpPr>
-        <p:spPr>
-          <a:xfrm flipH="1">
-            <a:off x="5105400" y="3321176"/>
-            <a:ext cx="586739" cy="0"/>
-          </a:xfrm>
-          <a:prstGeom prst="straightConnector1">
-            <a:avLst/>
-          </a:prstGeom>
-          <a:ln w="47625" cap="flat" cmpd="dbl">
+          <a:ln w="19050" cap="flat">
             <a:solidFill>
               <a:schemeClr val="tx1"/>
             </a:solidFill>
@@ -4057,7 +4365,7 @@
     </p:spTree>
     <p:extLst>
       <p:ext uri="{BB962C8B-B14F-4D97-AF65-F5344CB8AC3E}">
-        <p14:creationId xmlns:p14="http://schemas.microsoft.com/office/powerpoint/2010/main" val="709484210"/>
+        <p14:creationId xmlns:p14="http://schemas.microsoft.com/office/powerpoint/2010/main" val="1035968365"/>
       </p:ext>
     </p:extLst>
   </p:cSld>

</xml_diff>

<commit_message>
docs/scope_overview.pptx: mostly finish the diagram; write about string restrictions and important omissions
</commit_message>
<xml_diff>
--- a/docs/scope_overview.pptx
+++ b/docs/scope_overview.pptx
@@ -3270,8 +3270,8 @@
         </p:nvSpPr>
         <p:spPr>
           <a:xfrm>
-            <a:off x="926793" y="3429000"/>
-            <a:ext cx="2076209" cy="553998"/>
+            <a:off x="797441" y="2215173"/>
+            <a:ext cx="2098159" cy="553998"/>
           </a:xfrm>
           <a:prstGeom prst="rect">
             <a:avLst/>
@@ -3279,7 +3279,7 @@
           <a:noFill/>
         </p:spPr>
         <p:txBody>
-          <a:bodyPr wrap="none" rtlCol="0">
+          <a:bodyPr wrap="square" rtlCol="0">
             <a:spAutoFit/>
           </a:bodyPr>
           <a:lstStyle/>
@@ -3290,7 +3290,7 @@
                 <a:ea typeface="Tahoma" pitchFamily="34" charset="0"/>
                 <a:cs typeface="Tahoma" pitchFamily="34" charset="0"/>
               </a:rPr>
-              <a:t>Stream creates transports</a:t>
+              <a:t>Stream creates transports.</a:t>
             </a:r>
           </a:p>
           <a:p>
@@ -3300,7 +3300,7 @@
                 <a:ea typeface="Tahoma" pitchFamily="34" charset="0"/>
                 <a:cs typeface="Tahoma" pitchFamily="34" charset="0"/>
               </a:rPr>
-              <a:t>Stream has a reliable send queue</a:t>
+              <a:t>Stream has a reliable send queue.</a:t>
             </a:r>
           </a:p>
           <a:p>
@@ -3310,7 +3310,7 @@
                 <a:ea typeface="Tahoma" pitchFamily="34" charset="0"/>
                 <a:cs typeface="Tahoma" pitchFamily="34" charset="0"/>
               </a:rPr>
-              <a:t>Stream has a receive window</a:t>
+              <a:t>Stream has a receive window.</a:t>
             </a:r>
             <a:endParaRPr lang="en-US" sz="1000" dirty="0">
               <a:latin typeface="Tahoma" pitchFamily="34" charset="0"/>
@@ -3328,8 +3328,8 @@
         </p:nvSpPr>
         <p:spPr>
           <a:xfrm>
-            <a:off x="882258" y="2676728"/>
-            <a:ext cx="622286" cy="400110"/>
+            <a:off x="666750" y="3284577"/>
+            <a:ext cx="1066800" cy="553998"/>
           </a:xfrm>
           <a:prstGeom prst="rect">
             <a:avLst/>
@@ -3337,21 +3337,28 @@
           <a:noFill/>
         </p:spPr>
         <p:txBody>
-          <a:bodyPr wrap="none" rtlCol="0">
+          <a:bodyPr wrap="square" rtlCol="0">
             <a:spAutoFit/>
           </a:bodyPr>
           <a:lstStyle/>
           <a:p>
+            <a:pPr algn="ctr"/>
             <a:r>
               <a:rPr lang="en-US" sz="1000" dirty="0" smtClean="0">
                 <a:latin typeface="Tahoma" pitchFamily="34" charset="0"/>
                 <a:ea typeface="Tahoma" pitchFamily="34" charset="0"/>
                 <a:cs typeface="Tahoma" pitchFamily="34" charset="0"/>
               </a:rPr>
-              <a:t>ordered</a:t>
-            </a:r>
-          </a:p>
-          <a:p>
+              <a:t>bidirectional stream of ordered</a:t>
+            </a:r>
+            <a:r>
+              <a:rPr lang="en-US" sz="1000" dirty="0">
+                <a:latin typeface="Tahoma" pitchFamily="34" charset="0"/>
+                <a:ea typeface="Tahoma" pitchFamily="34" charset="0"/>
+                <a:cs typeface="Tahoma" pitchFamily="34" charset="0"/>
+              </a:rPr>
+              <a:t> </a:t>
+            </a:r>
             <a:r>
               <a:rPr lang="en-US" sz="1000" dirty="0" smtClean="0">
                 <a:latin typeface="Tahoma" pitchFamily="34" charset="0"/>
@@ -3619,7 +3626,7 @@
         </p:nvSpPr>
         <p:spPr>
           <a:xfrm>
-            <a:off x="2362202" y="1428690"/>
+            <a:off x="2819400" y="1428690"/>
             <a:ext cx="1630979" cy="400110"/>
           </a:xfrm>
           <a:prstGeom prst="rect">
@@ -3673,7 +3680,7 @@
         </p:nvSpPr>
         <p:spPr>
           <a:xfrm>
-            <a:off x="2362200" y="1805226"/>
+            <a:off x="2819400" y="1805226"/>
             <a:ext cx="1828800" cy="861774"/>
           </a:xfrm>
           <a:prstGeom prst="rect">
@@ -4077,7 +4084,7 @@
         </p:nvSpPr>
         <p:spPr>
           <a:xfrm rot="16200000">
-            <a:off x="2934730" y="1951932"/>
+            <a:off x="2934730" y="2028128"/>
             <a:ext cx="123217" cy="4186736"/>
           </a:xfrm>
           <a:prstGeom prst="leftBrace">
@@ -4123,7 +4130,7 @@
         </p:nvSpPr>
         <p:spPr>
           <a:xfrm>
-            <a:off x="2514602" y="4097183"/>
+            <a:off x="2514602" y="4173379"/>
             <a:ext cx="970137" cy="246221"/>
           </a:xfrm>
           <a:prstGeom prst="rect">
@@ -4362,6 +4369,976 @@
           </a:fontRef>
         </p:style>
       </p:cxnSp>
+      <p:sp>
+        <p:nvSpPr>
+          <p:cNvPr id="36" name="TextBox 35"/>
+          <p:cNvSpPr txBox="1"/>
+          <p:nvPr/>
+        </p:nvSpPr>
+        <p:spPr>
+          <a:xfrm>
+            <a:off x="4907442" y="3409890"/>
+            <a:ext cx="979008" cy="400110"/>
+          </a:xfrm>
+          <a:prstGeom prst="rect">
+            <a:avLst/>
+          </a:prstGeom>
+          <a:noFill/>
+        </p:spPr>
+        <p:txBody>
+          <a:bodyPr wrap="square" rtlCol="0">
+            <a:spAutoFit/>
+          </a:bodyPr>
+          <a:lstStyle/>
+          <a:p>
+            <a:pPr algn="ctr"/>
+            <a:r>
+              <a:rPr lang="en-US" sz="1000" dirty="0" smtClean="0">
+                <a:latin typeface="Tahoma" pitchFamily="34" charset="0"/>
+                <a:ea typeface="Tahoma" pitchFamily="34" charset="0"/>
+                <a:cs typeface="Tahoma" pitchFamily="34" charset="0"/>
+              </a:rPr>
+              <a:t>TCP stream over Internet</a:t>
+            </a:r>
+            <a:endParaRPr lang="en-US" sz="1000" dirty="0">
+              <a:latin typeface="Tahoma" pitchFamily="34" charset="0"/>
+              <a:ea typeface="Tahoma" pitchFamily="34" charset="0"/>
+              <a:cs typeface="Tahoma" pitchFamily="34" charset="0"/>
+            </a:endParaRPr>
+          </a:p>
+        </p:txBody>
+      </p:sp>
+      <p:sp>
+        <p:nvSpPr>
+          <p:cNvPr id="40" name="TextBox 39"/>
+          <p:cNvSpPr txBox="1"/>
+          <p:nvPr/>
+        </p:nvSpPr>
+        <p:spPr>
+          <a:xfrm>
+            <a:off x="3505200" y="3409890"/>
+            <a:ext cx="915923" cy="400110"/>
+          </a:xfrm>
+          <a:prstGeom prst="rect">
+            <a:avLst/>
+          </a:prstGeom>
+          <a:noFill/>
+        </p:spPr>
+        <p:txBody>
+          <a:bodyPr wrap="square" rtlCol="0">
+            <a:spAutoFit/>
+          </a:bodyPr>
+          <a:lstStyle/>
+          <a:p>
+            <a:pPr algn="ctr"/>
+            <a:r>
+              <a:rPr lang="en-US" sz="1000" dirty="0" smtClean="0">
+                <a:latin typeface="Tahoma" pitchFamily="34" charset="0"/>
+                <a:ea typeface="Tahoma" pitchFamily="34" charset="0"/>
+                <a:cs typeface="Tahoma" pitchFamily="34" charset="0"/>
+              </a:rPr>
+              <a:t>Minerva wire protocol</a:t>
+            </a:r>
+          </a:p>
+        </p:txBody>
+      </p:sp>
+      <p:sp>
+        <p:nvSpPr>
+          <p:cNvPr id="42" name="Left Brace 41"/>
+          <p:cNvSpPr/>
+          <p:nvPr/>
+        </p:nvSpPr>
+        <p:spPr>
+          <a:xfrm rot="16200000">
+            <a:off x="7795221" y="1979665"/>
+            <a:ext cx="123219" cy="4283660"/>
+          </a:xfrm>
+          <a:prstGeom prst="leftBrace">
+            <a:avLst/>
+          </a:prstGeom>
+          <a:ln w="19050">
+            <a:solidFill>
+              <a:schemeClr val="tx1">
+                <a:lumMod val="50000"/>
+                <a:lumOff val="50000"/>
+              </a:schemeClr>
+            </a:solidFill>
+          </a:ln>
+        </p:spPr>
+        <p:style>
+          <a:lnRef idx="1">
+            <a:schemeClr val="accent1"/>
+          </a:lnRef>
+          <a:fillRef idx="0">
+            <a:schemeClr val="accent1"/>
+          </a:fillRef>
+          <a:effectRef idx="0">
+            <a:schemeClr val="accent1"/>
+          </a:effectRef>
+          <a:fontRef idx="minor">
+            <a:schemeClr val="tx1"/>
+          </a:fontRef>
+        </p:style>
+        <p:txBody>
+          <a:bodyPr rtlCol="0" anchor="ctr"/>
+          <a:lstStyle/>
+          <a:p>
+            <a:pPr algn="ctr"/>
+            <a:endParaRPr lang="en-US" dirty="0"/>
+          </a:p>
+        </p:txBody>
+      </p:sp>
+      <p:sp>
+        <p:nvSpPr>
+          <p:cNvPr id="43" name="TextBox 42"/>
+          <p:cNvSpPr txBox="1"/>
+          <p:nvPr/>
+        </p:nvSpPr>
+        <p:spPr>
+          <a:xfrm>
+            <a:off x="7326632" y="4173379"/>
+            <a:ext cx="1019831" cy="246221"/>
+          </a:xfrm>
+          <a:prstGeom prst="rect">
+            <a:avLst/>
+          </a:prstGeom>
+          <a:noFill/>
+        </p:spPr>
+        <p:txBody>
+          <a:bodyPr wrap="none" rtlCol="0">
+            <a:spAutoFit/>
+          </a:bodyPr>
+          <a:lstStyle/>
+          <a:p>
+            <a:r>
+              <a:rPr lang="en-US" sz="1000" dirty="0" smtClean="0">
+                <a:latin typeface="Tahoma" pitchFamily="34" charset="0"/>
+                <a:ea typeface="Tahoma" pitchFamily="34" charset="0"/>
+                <a:cs typeface="Tahoma" pitchFamily="34" charset="0"/>
+              </a:rPr>
+              <a:t>Minerva server</a:t>
+            </a:r>
+          </a:p>
+        </p:txBody>
+      </p:sp>
+      <p:sp>
+        <p:nvSpPr>
+          <p:cNvPr id="45" name="TextBox 44"/>
+          <p:cNvSpPr txBox="1"/>
+          <p:nvPr/>
+        </p:nvSpPr>
+        <p:spPr>
+          <a:xfrm>
+            <a:off x="7183612" y="2696188"/>
+            <a:ext cx="800797" cy="461665"/>
+          </a:xfrm>
+          <a:prstGeom prst="rect">
+            <a:avLst/>
+          </a:prstGeom>
+          <a:noFill/>
+        </p:spPr>
+        <p:txBody>
+          <a:bodyPr wrap="none" rtlCol="0">
+            <a:spAutoFit/>
+          </a:bodyPr>
+          <a:lstStyle/>
+          <a:p>
+            <a:pPr algn="ctr"/>
+            <a:r>
+              <a:rPr lang="en-US" sz="1200" dirty="0" smtClean="0">
+                <a:latin typeface="Tahoma" pitchFamily="34" charset="0"/>
+                <a:ea typeface="Tahoma" pitchFamily="34" charset="0"/>
+                <a:cs typeface="Tahoma" pitchFamily="34" charset="0"/>
+              </a:rPr>
+              <a:t>Primary</a:t>
+            </a:r>
+          </a:p>
+          <a:p>
+            <a:pPr algn="ctr"/>
+            <a:r>
+              <a:rPr lang="en-US" sz="1200" dirty="0" smtClean="0">
+                <a:latin typeface="Tahoma" pitchFamily="34" charset="0"/>
+                <a:ea typeface="Tahoma" pitchFamily="34" charset="0"/>
+                <a:cs typeface="Tahoma" pitchFamily="34" charset="0"/>
+              </a:rPr>
+              <a:t>transport</a:t>
+            </a:r>
+            <a:endParaRPr lang="en-US" sz="1200" dirty="0">
+              <a:latin typeface="Tahoma" pitchFamily="34" charset="0"/>
+              <a:ea typeface="Tahoma" pitchFamily="34" charset="0"/>
+              <a:cs typeface="Tahoma" pitchFamily="34" charset="0"/>
+            </a:endParaRPr>
+          </a:p>
+        </p:txBody>
+      </p:sp>
+      <p:sp>
+        <p:nvSpPr>
+          <p:cNvPr id="46" name="TextBox 45"/>
+          <p:cNvSpPr txBox="1"/>
+          <p:nvPr/>
+        </p:nvSpPr>
+        <p:spPr>
+          <a:xfrm>
+            <a:off x="7086600" y="3079203"/>
+            <a:ext cx="1015022" cy="461665"/>
+          </a:xfrm>
+          <a:prstGeom prst="rect">
+            <a:avLst/>
+          </a:prstGeom>
+          <a:noFill/>
+        </p:spPr>
+        <p:txBody>
+          <a:bodyPr wrap="none" rtlCol="0">
+            <a:spAutoFit/>
+          </a:bodyPr>
+          <a:lstStyle/>
+          <a:p>
+            <a:pPr algn="ctr"/>
+            <a:r>
+              <a:rPr lang="en-US" sz="1200" dirty="0" smtClean="0">
+                <a:latin typeface="Tahoma" pitchFamily="34" charset="0"/>
+                <a:ea typeface="Tahoma" pitchFamily="34" charset="0"/>
+                <a:cs typeface="Tahoma" pitchFamily="34" charset="0"/>
+              </a:rPr>
+              <a:t>A secondary</a:t>
+            </a:r>
+          </a:p>
+          <a:p>
+            <a:pPr algn="ctr"/>
+            <a:r>
+              <a:rPr lang="en-US" sz="1200" dirty="0" smtClean="0">
+                <a:latin typeface="Tahoma" pitchFamily="34" charset="0"/>
+                <a:ea typeface="Tahoma" pitchFamily="34" charset="0"/>
+                <a:cs typeface="Tahoma" pitchFamily="34" charset="0"/>
+              </a:rPr>
+              <a:t>transport</a:t>
+            </a:r>
+          </a:p>
+        </p:txBody>
+      </p:sp>
+      <p:cxnSp>
+        <p:nvCxnSpPr>
+          <p:cNvPr id="47" name="Straight Arrow Connector 46"/>
+          <p:cNvCxnSpPr/>
+          <p:nvPr/>
+        </p:nvCxnSpPr>
+        <p:spPr>
+          <a:xfrm>
+            <a:off x="8047534" y="2857504"/>
+            <a:ext cx="586737" cy="0"/>
+          </a:xfrm>
+          <a:prstGeom prst="straightConnector1">
+            <a:avLst/>
+          </a:prstGeom>
+          <a:ln w="19050" cap="flat">
+            <a:solidFill>
+              <a:schemeClr val="tx1"/>
+            </a:solidFill>
+            <a:round/>
+            <a:tailEnd type="triangle"/>
+          </a:ln>
+        </p:spPr>
+        <p:style>
+          <a:lnRef idx="1">
+            <a:schemeClr val="accent1"/>
+          </a:lnRef>
+          <a:fillRef idx="0">
+            <a:schemeClr val="accent1"/>
+          </a:fillRef>
+          <a:effectRef idx="0">
+            <a:schemeClr val="accent1"/>
+          </a:effectRef>
+          <a:fontRef idx="minor">
+            <a:schemeClr val="tx1"/>
+          </a:fontRef>
+        </p:style>
+      </p:cxnSp>
+      <p:cxnSp>
+        <p:nvCxnSpPr>
+          <p:cNvPr id="48" name="Straight Arrow Connector 47"/>
+          <p:cNvCxnSpPr/>
+          <p:nvPr/>
+        </p:nvCxnSpPr>
+        <p:spPr>
+          <a:xfrm flipH="1">
+            <a:off x="8044912" y="2933704"/>
+            <a:ext cx="586739" cy="0"/>
+          </a:xfrm>
+          <a:prstGeom prst="straightConnector1">
+            <a:avLst/>
+          </a:prstGeom>
+          <a:ln w="19050" cap="flat">
+            <a:solidFill>
+              <a:schemeClr val="tx1"/>
+            </a:solidFill>
+            <a:round/>
+            <a:tailEnd type="triangle"/>
+          </a:ln>
+        </p:spPr>
+        <p:style>
+          <a:lnRef idx="1">
+            <a:schemeClr val="accent1"/>
+          </a:lnRef>
+          <a:fillRef idx="0">
+            <a:schemeClr val="accent1"/>
+          </a:fillRef>
+          <a:effectRef idx="0">
+            <a:schemeClr val="accent1"/>
+          </a:effectRef>
+          <a:fontRef idx="minor">
+            <a:schemeClr val="tx1"/>
+          </a:fontRef>
+        </p:style>
+      </p:cxnSp>
+      <p:cxnSp>
+        <p:nvCxnSpPr>
+          <p:cNvPr id="49" name="Straight Arrow Connector 48"/>
+          <p:cNvCxnSpPr/>
+          <p:nvPr/>
+        </p:nvCxnSpPr>
+        <p:spPr>
+          <a:xfrm>
+            <a:off x="8063231" y="3234039"/>
+            <a:ext cx="586737" cy="0"/>
+          </a:xfrm>
+          <a:prstGeom prst="straightConnector1">
+            <a:avLst/>
+          </a:prstGeom>
+          <a:ln w="19050" cap="flat">
+            <a:solidFill>
+              <a:schemeClr val="tx1"/>
+            </a:solidFill>
+            <a:round/>
+            <a:tailEnd type="triangle"/>
+          </a:ln>
+        </p:spPr>
+        <p:style>
+          <a:lnRef idx="1">
+            <a:schemeClr val="accent1"/>
+          </a:lnRef>
+          <a:fillRef idx="0">
+            <a:schemeClr val="accent1"/>
+          </a:fillRef>
+          <a:effectRef idx="0">
+            <a:schemeClr val="accent1"/>
+          </a:effectRef>
+          <a:fontRef idx="minor">
+            <a:schemeClr val="tx1"/>
+          </a:fontRef>
+        </p:style>
+      </p:cxnSp>
+      <p:cxnSp>
+        <p:nvCxnSpPr>
+          <p:cNvPr id="50" name="Straight Arrow Connector 49"/>
+          <p:cNvCxnSpPr/>
+          <p:nvPr/>
+        </p:nvCxnSpPr>
+        <p:spPr>
+          <a:xfrm flipH="1">
+            <a:off x="8060609" y="3310239"/>
+            <a:ext cx="586739" cy="0"/>
+          </a:xfrm>
+          <a:prstGeom prst="straightConnector1">
+            <a:avLst/>
+          </a:prstGeom>
+          <a:ln w="19050" cap="flat">
+            <a:solidFill>
+              <a:schemeClr val="tx1"/>
+            </a:solidFill>
+            <a:round/>
+            <a:tailEnd type="triangle"/>
+          </a:ln>
+        </p:spPr>
+        <p:style>
+          <a:lnRef idx="1">
+            <a:schemeClr val="accent1"/>
+          </a:lnRef>
+          <a:fillRef idx="0">
+            <a:schemeClr val="accent1"/>
+          </a:fillRef>
+          <a:effectRef idx="0">
+            <a:schemeClr val="accent1"/>
+          </a:effectRef>
+          <a:fontRef idx="minor">
+            <a:schemeClr val="tx1"/>
+          </a:fontRef>
+        </p:style>
+      </p:cxnSp>
+      <p:sp>
+        <p:nvSpPr>
+          <p:cNvPr id="51" name="TextBox 50"/>
+          <p:cNvSpPr txBox="1"/>
+          <p:nvPr/>
+        </p:nvSpPr>
+        <p:spPr>
+          <a:xfrm>
+            <a:off x="8667750" y="2857504"/>
+            <a:ext cx="717120" cy="461665"/>
+          </a:xfrm>
+          <a:prstGeom prst="rect">
+            <a:avLst/>
+          </a:prstGeom>
+          <a:noFill/>
+        </p:spPr>
+        <p:txBody>
+          <a:bodyPr wrap="none" rtlCol="0">
+            <a:spAutoFit/>
+          </a:bodyPr>
+          <a:lstStyle/>
+          <a:p>
+            <a:pPr algn="ctr"/>
+            <a:r>
+              <a:rPr lang="en-US" sz="1200" dirty="0" smtClean="0">
+                <a:latin typeface="Tahoma" pitchFamily="34" charset="0"/>
+                <a:ea typeface="Tahoma" pitchFamily="34" charset="0"/>
+                <a:cs typeface="Tahoma" pitchFamily="34" charset="0"/>
+              </a:rPr>
+              <a:t>Minerva</a:t>
+            </a:r>
+          </a:p>
+          <a:p>
+            <a:pPr algn="ctr"/>
+            <a:r>
+              <a:rPr lang="en-US" sz="1200" dirty="0" smtClean="0">
+                <a:latin typeface="Tahoma" pitchFamily="34" charset="0"/>
+                <a:ea typeface="Tahoma" pitchFamily="34" charset="0"/>
+                <a:cs typeface="Tahoma" pitchFamily="34" charset="0"/>
+              </a:rPr>
+              <a:t>Stream</a:t>
+            </a:r>
+            <a:endParaRPr lang="en-US" sz="1200" dirty="0">
+              <a:latin typeface="Tahoma" pitchFamily="34" charset="0"/>
+              <a:ea typeface="Tahoma" pitchFamily="34" charset="0"/>
+              <a:cs typeface="Tahoma" pitchFamily="34" charset="0"/>
+            </a:endParaRPr>
+          </a:p>
+        </p:txBody>
+      </p:sp>
+      <p:sp>
+        <p:nvSpPr>
+          <p:cNvPr id="52" name="TextBox 51"/>
+          <p:cNvSpPr txBox="1"/>
+          <p:nvPr/>
+        </p:nvSpPr>
+        <p:spPr>
+          <a:xfrm>
+            <a:off x="7042688" y="2133600"/>
+            <a:ext cx="1186912" cy="553998"/>
+          </a:xfrm>
+          <a:prstGeom prst="rect">
+            <a:avLst/>
+          </a:prstGeom>
+          <a:noFill/>
+        </p:spPr>
+        <p:txBody>
+          <a:bodyPr wrap="square" rtlCol="0">
+            <a:spAutoFit/>
+          </a:bodyPr>
+          <a:lstStyle/>
+          <a:p>
+            <a:r>
+              <a:rPr lang="en-US" sz="1000" dirty="0" smtClean="0">
+                <a:latin typeface="Tahoma" pitchFamily="34" charset="0"/>
+                <a:ea typeface="Tahoma" pitchFamily="34" charset="0"/>
+                <a:cs typeface="Tahoma" pitchFamily="34" charset="0"/>
+              </a:rPr>
+              <a:t>Server knows about transports created by client.</a:t>
+            </a:r>
+            <a:endParaRPr lang="en-US" sz="1000" dirty="0">
+              <a:latin typeface="Tahoma" pitchFamily="34" charset="0"/>
+              <a:ea typeface="Tahoma" pitchFamily="34" charset="0"/>
+              <a:cs typeface="Tahoma" pitchFamily="34" charset="0"/>
+            </a:endParaRPr>
+          </a:p>
+        </p:txBody>
+      </p:sp>
+      <p:sp>
+        <p:nvSpPr>
+          <p:cNvPr id="53" name="TextBox 52"/>
+          <p:cNvSpPr txBox="1"/>
+          <p:nvPr/>
+        </p:nvSpPr>
+        <p:spPr>
+          <a:xfrm>
+            <a:off x="8188841" y="2133600"/>
+            <a:ext cx="2098159" cy="553998"/>
+          </a:xfrm>
+          <a:prstGeom prst="rect">
+            <a:avLst/>
+          </a:prstGeom>
+          <a:noFill/>
+        </p:spPr>
+        <p:txBody>
+          <a:bodyPr wrap="square" rtlCol="0">
+            <a:spAutoFit/>
+          </a:bodyPr>
+          <a:lstStyle/>
+          <a:p>
+            <a:r>
+              <a:rPr lang="en-US" sz="1000" dirty="0" smtClean="0">
+                <a:latin typeface="Tahoma" pitchFamily="34" charset="0"/>
+                <a:ea typeface="Tahoma" pitchFamily="34" charset="0"/>
+                <a:cs typeface="Tahoma" pitchFamily="34" charset="0"/>
+              </a:rPr>
+              <a:t>Stream receives new transports.</a:t>
+            </a:r>
+          </a:p>
+          <a:p>
+            <a:r>
+              <a:rPr lang="en-US" sz="1000" dirty="0" smtClean="0">
+                <a:latin typeface="Tahoma" pitchFamily="34" charset="0"/>
+                <a:ea typeface="Tahoma" pitchFamily="34" charset="0"/>
+                <a:cs typeface="Tahoma" pitchFamily="34" charset="0"/>
+              </a:rPr>
+              <a:t>Stream has a reliable send queue.</a:t>
+            </a:r>
+          </a:p>
+          <a:p>
+            <a:r>
+              <a:rPr lang="en-US" sz="1000" dirty="0" smtClean="0">
+                <a:latin typeface="Tahoma" pitchFamily="34" charset="0"/>
+                <a:ea typeface="Tahoma" pitchFamily="34" charset="0"/>
+                <a:cs typeface="Tahoma" pitchFamily="34" charset="0"/>
+              </a:rPr>
+              <a:t>Stream has a receive window.</a:t>
+            </a:r>
+            <a:endParaRPr lang="en-US" sz="1000" dirty="0">
+              <a:latin typeface="Tahoma" pitchFamily="34" charset="0"/>
+              <a:ea typeface="Tahoma" pitchFamily="34" charset="0"/>
+              <a:cs typeface="Tahoma" pitchFamily="34" charset="0"/>
+            </a:endParaRPr>
+          </a:p>
+        </p:txBody>
+      </p:sp>
+      <p:sp>
+        <p:nvSpPr>
+          <p:cNvPr id="54" name="TextBox 53"/>
+          <p:cNvSpPr txBox="1"/>
+          <p:nvPr/>
+        </p:nvSpPr>
+        <p:spPr>
+          <a:xfrm>
+            <a:off x="2066925" y="3408402"/>
+            <a:ext cx="775336" cy="553998"/>
+          </a:xfrm>
+          <a:prstGeom prst="rect">
+            <a:avLst/>
+          </a:prstGeom>
+          <a:noFill/>
+        </p:spPr>
+        <p:txBody>
+          <a:bodyPr wrap="square" rtlCol="0">
+            <a:spAutoFit/>
+          </a:bodyPr>
+          <a:lstStyle/>
+          <a:p>
+            <a:pPr algn="ctr"/>
+            <a:r>
+              <a:rPr lang="en-US" sz="1000" dirty="0" smtClean="0">
+                <a:latin typeface="Tahoma" pitchFamily="34" charset="0"/>
+                <a:ea typeface="Tahoma" pitchFamily="34" charset="0"/>
+                <a:cs typeface="Tahoma" pitchFamily="34" charset="0"/>
+              </a:rPr>
+              <a:t>Unordered strings, ACKS, etc.</a:t>
+            </a:r>
+            <a:endParaRPr lang="en-US" sz="1000" dirty="0">
+              <a:latin typeface="Tahoma" pitchFamily="34" charset="0"/>
+              <a:ea typeface="Tahoma" pitchFamily="34" charset="0"/>
+              <a:cs typeface="Tahoma" pitchFamily="34" charset="0"/>
+            </a:endParaRPr>
+          </a:p>
+        </p:txBody>
+      </p:sp>
+      <p:sp>
+        <p:nvSpPr>
+          <p:cNvPr id="55" name="TextBox 54"/>
+          <p:cNvSpPr txBox="1"/>
+          <p:nvPr/>
+        </p:nvSpPr>
+        <p:spPr>
+          <a:xfrm>
+            <a:off x="7997745" y="3381315"/>
+            <a:ext cx="775336" cy="553998"/>
+          </a:xfrm>
+          <a:prstGeom prst="rect">
+            <a:avLst/>
+          </a:prstGeom>
+          <a:noFill/>
+        </p:spPr>
+        <p:txBody>
+          <a:bodyPr wrap="square" rtlCol="0">
+            <a:spAutoFit/>
+          </a:bodyPr>
+          <a:lstStyle/>
+          <a:p>
+            <a:pPr algn="ctr"/>
+            <a:r>
+              <a:rPr lang="en-US" sz="1000" dirty="0" smtClean="0">
+                <a:latin typeface="Tahoma" pitchFamily="34" charset="0"/>
+                <a:ea typeface="Tahoma" pitchFamily="34" charset="0"/>
+                <a:cs typeface="Tahoma" pitchFamily="34" charset="0"/>
+              </a:rPr>
+              <a:t>Unordered strings, ACKS, etc.</a:t>
+            </a:r>
+            <a:endParaRPr lang="en-US" sz="1000" dirty="0">
+              <a:latin typeface="Tahoma" pitchFamily="34" charset="0"/>
+              <a:ea typeface="Tahoma" pitchFamily="34" charset="0"/>
+              <a:cs typeface="Tahoma" pitchFamily="34" charset="0"/>
+            </a:endParaRPr>
+          </a:p>
+        </p:txBody>
+      </p:sp>
+      <p:sp>
+        <p:nvSpPr>
+          <p:cNvPr id="57" name="TextBox 56"/>
+          <p:cNvSpPr txBox="1"/>
+          <p:nvPr/>
+        </p:nvSpPr>
+        <p:spPr>
+          <a:xfrm>
+            <a:off x="6343343" y="3409890"/>
+            <a:ext cx="915923" cy="400110"/>
+          </a:xfrm>
+          <a:prstGeom prst="rect">
+            <a:avLst/>
+          </a:prstGeom>
+          <a:noFill/>
+        </p:spPr>
+        <p:txBody>
+          <a:bodyPr wrap="square" rtlCol="0">
+            <a:spAutoFit/>
+          </a:bodyPr>
+          <a:lstStyle/>
+          <a:p>
+            <a:pPr algn="ctr"/>
+            <a:r>
+              <a:rPr lang="en-US" sz="1000" dirty="0" smtClean="0">
+                <a:latin typeface="Tahoma" pitchFamily="34" charset="0"/>
+                <a:ea typeface="Tahoma" pitchFamily="34" charset="0"/>
+                <a:cs typeface="Tahoma" pitchFamily="34" charset="0"/>
+              </a:rPr>
+              <a:t>Minerva wire protocol</a:t>
+            </a:r>
+          </a:p>
+        </p:txBody>
+      </p:sp>
+      <p:sp>
+        <p:nvSpPr>
+          <p:cNvPr id="58" name="TextBox 57"/>
+          <p:cNvSpPr txBox="1"/>
+          <p:nvPr/>
+        </p:nvSpPr>
+        <p:spPr>
+          <a:xfrm>
+            <a:off x="10033052" y="2924014"/>
+            <a:ext cx="919547" cy="276999"/>
+          </a:xfrm>
+          <a:prstGeom prst="rect">
+            <a:avLst/>
+          </a:prstGeom>
+          <a:noFill/>
+        </p:spPr>
+        <p:txBody>
+          <a:bodyPr wrap="none" rtlCol="0">
+            <a:spAutoFit/>
+          </a:bodyPr>
+          <a:lstStyle/>
+          <a:p>
+            <a:r>
+              <a:rPr lang="en-US" sz="1200" dirty="0" smtClean="0">
+                <a:latin typeface="Tahoma" pitchFamily="34" charset="0"/>
+                <a:ea typeface="Tahoma" pitchFamily="34" charset="0"/>
+                <a:cs typeface="Tahoma" pitchFamily="34" charset="0"/>
+              </a:rPr>
+              <a:t>Server app</a:t>
+            </a:r>
+            <a:endParaRPr lang="en-US" sz="1200" dirty="0">
+              <a:latin typeface="Tahoma" pitchFamily="34" charset="0"/>
+              <a:ea typeface="Tahoma" pitchFamily="34" charset="0"/>
+              <a:cs typeface="Tahoma" pitchFamily="34" charset="0"/>
+            </a:endParaRPr>
+          </a:p>
+        </p:txBody>
+      </p:sp>
+      <p:cxnSp>
+        <p:nvCxnSpPr>
+          <p:cNvPr id="59" name="Straight Arrow Connector 58"/>
+          <p:cNvCxnSpPr/>
+          <p:nvPr/>
+        </p:nvCxnSpPr>
+        <p:spPr>
+          <a:xfrm>
+            <a:off x="9411922" y="3048000"/>
+            <a:ext cx="586737" cy="0"/>
+          </a:xfrm>
+          <a:prstGeom prst="straightConnector1">
+            <a:avLst/>
+          </a:prstGeom>
+          <a:ln w="19050" cap="flat">
+            <a:solidFill>
+              <a:schemeClr val="tx1"/>
+            </a:solidFill>
+            <a:round/>
+            <a:tailEnd type="triangle"/>
+          </a:ln>
+        </p:spPr>
+        <p:style>
+          <a:lnRef idx="1">
+            <a:schemeClr val="accent1"/>
+          </a:lnRef>
+          <a:fillRef idx="0">
+            <a:schemeClr val="accent1"/>
+          </a:fillRef>
+          <a:effectRef idx="0">
+            <a:schemeClr val="accent1"/>
+          </a:effectRef>
+          <a:fontRef idx="minor">
+            <a:schemeClr val="tx1"/>
+          </a:fontRef>
+        </p:style>
+      </p:cxnSp>
+      <p:cxnSp>
+        <p:nvCxnSpPr>
+          <p:cNvPr id="60" name="Straight Arrow Connector 59"/>
+          <p:cNvCxnSpPr/>
+          <p:nvPr/>
+        </p:nvCxnSpPr>
+        <p:spPr>
+          <a:xfrm flipH="1">
+            <a:off x="9411920" y="3124200"/>
+            <a:ext cx="586739" cy="0"/>
+          </a:xfrm>
+          <a:prstGeom prst="straightConnector1">
+            <a:avLst/>
+          </a:prstGeom>
+          <a:ln w="19050" cap="flat">
+            <a:solidFill>
+              <a:schemeClr val="tx1"/>
+            </a:solidFill>
+            <a:round/>
+            <a:tailEnd type="triangle"/>
+          </a:ln>
+        </p:spPr>
+        <p:style>
+          <a:lnRef idx="1">
+            <a:schemeClr val="accent1"/>
+          </a:lnRef>
+          <a:fillRef idx="0">
+            <a:schemeClr val="accent1"/>
+          </a:fillRef>
+          <a:effectRef idx="0">
+            <a:schemeClr val="accent1"/>
+          </a:effectRef>
+          <a:fontRef idx="minor">
+            <a:schemeClr val="tx1"/>
+          </a:fontRef>
+        </p:style>
+      </p:cxnSp>
+      <p:sp>
+        <p:nvSpPr>
+          <p:cNvPr id="61" name="TextBox 60"/>
+          <p:cNvSpPr txBox="1"/>
+          <p:nvPr/>
+        </p:nvSpPr>
+        <p:spPr>
+          <a:xfrm>
+            <a:off x="9182100" y="3208377"/>
+            <a:ext cx="1066800" cy="553998"/>
+          </a:xfrm>
+          <a:prstGeom prst="rect">
+            <a:avLst/>
+          </a:prstGeom>
+          <a:noFill/>
+        </p:spPr>
+        <p:txBody>
+          <a:bodyPr wrap="square" rtlCol="0">
+            <a:spAutoFit/>
+          </a:bodyPr>
+          <a:lstStyle/>
+          <a:p>
+            <a:pPr algn="ctr"/>
+            <a:r>
+              <a:rPr lang="en-US" sz="1000" dirty="0" smtClean="0">
+                <a:latin typeface="Tahoma" pitchFamily="34" charset="0"/>
+                <a:ea typeface="Tahoma" pitchFamily="34" charset="0"/>
+                <a:cs typeface="Tahoma" pitchFamily="34" charset="0"/>
+              </a:rPr>
+              <a:t>bidirectional stream of ordered</a:t>
+            </a:r>
+            <a:r>
+              <a:rPr lang="en-US" sz="1000" dirty="0">
+                <a:latin typeface="Tahoma" pitchFamily="34" charset="0"/>
+                <a:ea typeface="Tahoma" pitchFamily="34" charset="0"/>
+                <a:cs typeface="Tahoma" pitchFamily="34" charset="0"/>
+              </a:rPr>
+              <a:t> </a:t>
+            </a:r>
+            <a:r>
+              <a:rPr lang="en-US" sz="1000" dirty="0" smtClean="0">
+                <a:latin typeface="Tahoma" pitchFamily="34" charset="0"/>
+                <a:ea typeface="Tahoma" pitchFamily="34" charset="0"/>
+                <a:cs typeface="Tahoma" pitchFamily="34" charset="0"/>
+              </a:rPr>
+              <a:t>strings</a:t>
+            </a:r>
+            <a:endParaRPr lang="en-US" sz="1000" dirty="0">
+              <a:latin typeface="Tahoma" pitchFamily="34" charset="0"/>
+              <a:ea typeface="Tahoma" pitchFamily="34" charset="0"/>
+              <a:cs typeface="Tahoma" pitchFamily="34" charset="0"/>
+            </a:endParaRPr>
+          </a:p>
+        </p:txBody>
+      </p:sp>
+      <p:sp>
+        <p:nvSpPr>
+          <p:cNvPr id="63" name="TextBox 62"/>
+          <p:cNvSpPr txBox="1"/>
+          <p:nvPr/>
+        </p:nvSpPr>
+        <p:spPr>
+          <a:xfrm>
+            <a:off x="152400" y="5486400"/>
+            <a:ext cx="11517248" cy="276999"/>
+          </a:xfrm>
+          <a:prstGeom prst="rect">
+            <a:avLst/>
+          </a:prstGeom>
+          <a:noFill/>
+        </p:spPr>
+        <p:txBody>
+          <a:bodyPr wrap="square" rtlCol="0">
+            <a:spAutoFit/>
+          </a:bodyPr>
+          <a:lstStyle/>
+          <a:p>
+            <a:r>
+              <a:rPr lang="en-US" sz="1200" dirty="0" smtClean="0">
+                <a:latin typeface="Tahoma" pitchFamily="34" charset="0"/>
+                <a:ea typeface="Tahoma" pitchFamily="34" charset="0"/>
+                <a:cs typeface="Tahoma" pitchFamily="34" charset="0"/>
+              </a:rPr>
+              <a:t>Important omissions: transport authentication (</a:t>
+            </a:r>
+            <a:r>
+              <a:rPr lang="en-US" sz="1200" dirty="0" err="1" smtClean="0">
+                <a:latin typeface="Tahoma" pitchFamily="34" charset="0"/>
+                <a:ea typeface="Tahoma" pitchFamily="34" charset="0"/>
+                <a:cs typeface="Tahoma" pitchFamily="34" charset="0"/>
+              </a:rPr>
+              <a:t>credentialsData</a:t>
+            </a:r>
+            <a:r>
+              <a:rPr lang="en-US" sz="1200" dirty="0" smtClean="0">
+                <a:latin typeface="Tahoma" pitchFamily="34" charset="0"/>
+                <a:ea typeface="Tahoma" pitchFamily="34" charset="0"/>
+                <a:cs typeface="Tahoma" pitchFamily="34" charset="0"/>
+              </a:rPr>
+              <a:t>), </a:t>
+            </a:r>
+            <a:r>
+              <a:rPr lang="en-US" sz="1200" dirty="0" smtClean="0">
+                <a:latin typeface="Tahoma" pitchFamily="34" charset="0"/>
+                <a:ea typeface="Tahoma" pitchFamily="34" charset="0"/>
+                <a:cs typeface="Tahoma" pitchFamily="34" charset="0"/>
+              </a:rPr>
+              <a:t>Stream reset (disconnection), </a:t>
+            </a:r>
+            <a:r>
+              <a:rPr lang="en-US" sz="1200" dirty="0" smtClean="0">
+                <a:latin typeface="Tahoma" pitchFamily="34" charset="0"/>
+                <a:ea typeface="Tahoma" pitchFamily="34" charset="0"/>
+                <a:cs typeface="Tahoma" pitchFamily="34" charset="0"/>
+              </a:rPr>
+              <a:t>transport implementation details (XHR, Flash Socket).</a:t>
+            </a:r>
+          </a:p>
+        </p:txBody>
+      </p:sp>
+      <p:sp>
+        <p:nvSpPr>
+          <p:cNvPr id="64" name="TextBox 63"/>
+          <p:cNvSpPr txBox="1"/>
+          <p:nvPr/>
+        </p:nvSpPr>
+        <p:spPr>
+          <a:xfrm>
+            <a:off x="152400" y="4648200"/>
+            <a:ext cx="9951242" cy="646331"/>
+          </a:xfrm>
+          <a:prstGeom prst="rect">
+            <a:avLst/>
+          </a:prstGeom>
+          <a:noFill/>
+        </p:spPr>
+        <p:txBody>
+          <a:bodyPr wrap="square" rtlCol="0">
+            <a:spAutoFit/>
+          </a:bodyPr>
+          <a:lstStyle/>
+          <a:p>
+            <a:r>
+              <a:rPr lang="en-US" sz="1200" dirty="0" smtClean="0">
+                <a:latin typeface="Tahoma" pitchFamily="34" charset="0"/>
+                <a:ea typeface="Tahoma" pitchFamily="34" charset="0"/>
+                <a:cs typeface="Tahoma" pitchFamily="34" charset="0"/>
+              </a:rPr>
+              <a:t>Minerva strings are restricted to 0x20 (“ </a:t>
+            </a:r>
+            <a:r>
+              <a:rPr lang="en-US" sz="1200" dirty="0" smtClean="0">
+                <a:latin typeface="Tahoma" pitchFamily="34" charset="0"/>
+                <a:ea typeface="Tahoma" pitchFamily="34" charset="0"/>
+                <a:cs typeface="Tahoma" pitchFamily="34" charset="0"/>
+              </a:rPr>
+              <a:t>”</a:t>
+            </a:r>
+            <a:r>
+              <a:rPr lang="en-US" sz="1200" dirty="0" smtClean="0">
+                <a:latin typeface="Tahoma" pitchFamily="34" charset="0"/>
+                <a:ea typeface="Tahoma" pitchFamily="34" charset="0"/>
+                <a:cs typeface="Tahoma" pitchFamily="34" charset="0"/>
+              </a:rPr>
+              <a:t>) – 0x7E (“~”), allowing these 95 characters (“ </a:t>
+            </a:r>
+            <a:r>
+              <a:rPr lang="en-US" sz="1200" dirty="0" smtClean="0">
+                <a:latin typeface="Tahoma" pitchFamily="34" charset="0"/>
+                <a:ea typeface="Tahoma" pitchFamily="34" charset="0"/>
+                <a:cs typeface="Tahoma" pitchFamily="34" charset="0"/>
+              </a:rPr>
+              <a:t>”</a:t>
+            </a:r>
+            <a:r>
+              <a:rPr lang="en-US" sz="1200" dirty="0" smtClean="0">
+                <a:latin typeface="Tahoma" pitchFamily="34" charset="0"/>
+                <a:ea typeface="Tahoma" pitchFamily="34" charset="0"/>
+                <a:cs typeface="Tahoma" pitchFamily="34" charset="0"/>
+              </a:rPr>
+              <a:t> is first):</a:t>
+            </a:r>
+          </a:p>
+          <a:p>
+            <a:r>
+              <a:rPr lang="en-US" sz="1200" dirty="0" smtClean="0">
+                <a:latin typeface="Courier New" pitchFamily="49" charset="0"/>
+                <a:ea typeface="Tahoma" pitchFamily="34" charset="0"/>
+                <a:cs typeface="Courier New" pitchFamily="49" charset="0"/>
+              </a:rPr>
+              <a:t> !"#$%&amp;\'()*+,-./0123456789:;&lt;=&gt;?@ABCDEFGHIJKLMNOPQRSTUVWXYZ[\]^_`abcdefghijklmnopqrstuvwxyz{|}~</a:t>
+            </a:r>
+          </a:p>
+          <a:p>
+            <a:r>
+              <a:rPr lang="en-US" sz="1200" dirty="0" smtClean="0">
+                <a:latin typeface="Tahoma" pitchFamily="34" charset="0"/>
+                <a:ea typeface="Tahoma" pitchFamily="34" charset="0"/>
+                <a:cs typeface="Tahoma" pitchFamily="34" charset="0"/>
+              </a:rPr>
+              <a:t>This is usable for 7-bit JSON, Base64, Base85, and custom serialization formats.</a:t>
+            </a:r>
+          </a:p>
+        </p:txBody>
+      </p:sp>
     </p:spTree>
     <p:extLst>
       <p:ext uri="{BB962C8B-B14F-4D97-AF65-F5344CB8AC3E}">

</xml_diff>

<commit_message>
docs/scope_overview.pptx: make something slightly clearer
</commit_message>
<xml_diff>
--- a/docs/scope_overview.pptx
+++ b/docs/scope_overview.pptx
@@ -5247,12 +5247,12 @@
               <a:t>), </a:t>
             </a:r>
             <a:r>
-              <a:rPr lang="en-US" sz="1200" dirty="0" smtClean="0">
+              <a:rPr lang="en-US" sz="1200" smtClean="0">
                 <a:latin typeface="Tahoma" pitchFamily="34" charset="0"/>
                 <a:ea typeface="Tahoma" pitchFamily="34" charset="0"/>
                 <a:cs typeface="Tahoma" pitchFamily="34" charset="0"/>
               </a:rPr>
-              <a:t>Stream reset (disconnection), </a:t>
+              <a:t>Stream reset/disconnection, </a:t>
             </a:r>
             <a:r>
               <a:rPr lang="en-US" sz="1200" dirty="0" smtClean="0">

</xml_diff>